<commit_message>
create MVVM No.6 app
</commit_message>
<xml_diff>
--- a/tk_sample_apps/GUIとMVCパターン_PythonのTKinterを使った実例2.pptx
+++ b/tk_sample_apps/GUIとMVCパターン_PythonのTKinterを使った実例2.pptx
@@ -15,6 +15,8 @@
     <p:sldId id="265" r:id="rId9"/>
     <p:sldId id="261" r:id="rId10"/>
     <p:sldId id="266" r:id="rId11"/>
+    <p:sldId id="267" r:id="rId12"/>
+    <p:sldId id="268" r:id="rId13"/>
   </p:sldIdLst>
   <p:sldSz cx="12192000" cy="6858000"/>
   <p:notesSz cx="6858000" cy="9144000"/>
@@ -427,7 +429,7 @@
           <a:p>
             <a:fld id="{59334B04-B020-45BA-9925-266A2F4C3B55}" type="datetimeFigureOut">
               <a:rPr kumimoji="1" lang="ja-JP" altLang="en-US" smtClean="0"/>
-              <a:t>2025/5/25</a:t>
+              <a:t>2025/6/8</a:t>
             </a:fld>
             <a:endParaRPr kumimoji="1" lang="ja-JP" altLang="en-US"/>
           </a:p>
@@ -657,7 +659,7 @@
           <a:p>
             <a:fld id="{59334B04-B020-45BA-9925-266A2F4C3B55}" type="datetimeFigureOut">
               <a:rPr kumimoji="1" lang="ja-JP" altLang="en-US" smtClean="0"/>
-              <a:t>2025/5/25</a:t>
+              <a:t>2025/6/8</a:t>
             </a:fld>
             <a:endParaRPr kumimoji="1" lang="ja-JP" altLang="en-US"/>
           </a:p>
@@ -897,7 +899,7 @@
           <a:p>
             <a:fld id="{59334B04-B020-45BA-9925-266A2F4C3B55}" type="datetimeFigureOut">
               <a:rPr kumimoji="1" lang="ja-JP" altLang="en-US" smtClean="0"/>
-              <a:t>2025/5/25</a:t>
+              <a:t>2025/6/8</a:t>
             </a:fld>
             <a:endParaRPr kumimoji="1" lang="ja-JP" altLang="en-US"/>
           </a:p>
@@ -1127,7 +1129,7 @@
           <a:p>
             <a:fld id="{59334B04-B020-45BA-9925-266A2F4C3B55}" type="datetimeFigureOut">
               <a:rPr kumimoji="1" lang="ja-JP" altLang="en-US" smtClean="0"/>
-              <a:t>2025/5/25</a:t>
+              <a:t>2025/6/8</a:t>
             </a:fld>
             <a:endParaRPr kumimoji="1" lang="ja-JP" altLang="en-US"/>
           </a:p>
@@ -1402,7 +1404,7 @@
           <a:p>
             <a:fld id="{59334B04-B020-45BA-9925-266A2F4C3B55}" type="datetimeFigureOut">
               <a:rPr kumimoji="1" lang="ja-JP" altLang="en-US" smtClean="0"/>
-              <a:t>2025/5/25</a:t>
+              <a:t>2025/6/8</a:t>
             </a:fld>
             <a:endParaRPr kumimoji="1" lang="ja-JP" altLang="en-US"/>
           </a:p>
@@ -1731,7 +1733,7 @@
           <a:p>
             <a:fld id="{59334B04-B020-45BA-9925-266A2F4C3B55}" type="datetimeFigureOut">
               <a:rPr kumimoji="1" lang="ja-JP" altLang="en-US" smtClean="0"/>
-              <a:t>2025/5/25</a:t>
+              <a:t>2025/6/8</a:t>
             </a:fld>
             <a:endParaRPr kumimoji="1" lang="ja-JP" altLang="en-US"/>
           </a:p>
@@ -2207,7 +2209,7 @@
           <a:p>
             <a:fld id="{59334B04-B020-45BA-9925-266A2F4C3B55}" type="datetimeFigureOut">
               <a:rPr kumimoji="1" lang="ja-JP" altLang="en-US" smtClean="0"/>
-              <a:t>2025/5/25</a:t>
+              <a:t>2025/6/8</a:t>
             </a:fld>
             <a:endParaRPr kumimoji="1" lang="ja-JP" altLang="en-US"/>
           </a:p>
@@ -2348,7 +2350,7 @@
           <a:p>
             <a:fld id="{59334B04-B020-45BA-9925-266A2F4C3B55}" type="datetimeFigureOut">
               <a:rPr kumimoji="1" lang="ja-JP" altLang="en-US" smtClean="0"/>
-              <a:t>2025/5/25</a:t>
+              <a:t>2025/6/8</a:t>
             </a:fld>
             <a:endParaRPr kumimoji="1" lang="ja-JP" altLang="en-US"/>
           </a:p>
@@ -2461,7 +2463,7 @@
           <a:p>
             <a:fld id="{59334B04-B020-45BA-9925-266A2F4C3B55}" type="datetimeFigureOut">
               <a:rPr kumimoji="1" lang="ja-JP" altLang="en-US" smtClean="0"/>
-              <a:t>2025/5/25</a:t>
+              <a:t>2025/6/8</a:t>
             </a:fld>
             <a:endParaRPr kumimoji="1" lang="ja-JP" altLang="en-US"/>
           </a:p>
@@ -2804,7 +2806,7 @@
           <a:p>
             <a:fld id="{59334B04-B020-45BA-9925-266A2F4C3B55}" type="datetimeFigureOut">
               <a:rPr kumimoji="1" lang="ja-JP" altLang="en-US" smtClean="0"/>
-              <a:t>2025/5/25</a:t>
+              <a:t>2025/6/8</a:t>
             </a:fld>
             <a:endParaRPr kumimoji="1" lang="ja-JP" altLang="en-US"/>
           </a:p>
@@ -3092,7 +3094,7 @@
           <a:p>
             <a:fld id="{59334B04-B020-45BA-9925-266A2F4C3B55}" type="datetimeFigureOut">
               <a:rPr kumimoji="1" lang="ja-JP" altLang="en-US" smtClean="0"/>
-              <a:t>2025/5/25</a:t>
+              <a:t>2025/6/8</a:t>
             </a:fld>
             <a:endParaRPr kumimoji="1" lang="ja-JP" altLang="en-US"/>
           </a:p>
@@ -3365,7 +3367,7 @@
           <a:p>
             <a:fld id="{59334B04-B020-45BA-9925-266A2F4C3B55}" type="datetimeFigureOut">
               <a:rPr kumimoji="1" lang="ja-JP" altLang="en-US" smtClean="0"/>
-              <a:t>2025/5/25</a:t>
+              <a:t>2025/6/8</a:t>
             </a:fld>
             <a:endParaRPr kumimoji="1" lang="ja-JP" altLang="en-US"/>
           </a:p>
@@ -4131,6 +4133,3509 @@
     <p:extLst>
       <p:ext uri="{BB962C8B-B14F-4D97-AF65-F5344CB8AC3E}">
         <p14:creationId xmlns:p14="http://schemas.microsoft.com/office/powerpoint/2010/main" val="3219947111"/>
+      </p:ext>
+    </p:extLst>
+  </p:cSld>
+  <p:clrMapOvr>
+    <a:masterClrMapping/>
+  </p:clrMapOvr>
+</p:sld>
+</file>
+
+<file path=ppt/slides/slide11.xml><?xml version="1.0" encoding="utf-8"?>
+<p:sld xmlns:a="http://schemas.openxmlformats.org/drawingml/2006/main" xmlns:r="http://schemas.openxmlformats.org/officeDocument/2006/relationships" xmlns:p="http://schemas.openxmlformats.org/presentationml/2006/main">
+  <p:cSld>
+    <p:spTree>
+      <p:nvGrpSpPr>
+        <p:cNvPr id="1" name=""/>
+        <p:cNvGrpSpPr/>
+        <p:nvPr/>
+      </p:nvGrpSpPr>
+      <p:grpSpPr>
+        <a:xfrm>
+          <a:off x="0" y="0"/>
+          <a:ext cx="0" cy="0"/>
+          <a:chOff x="0" y="0"/>
+          <a:chExt cx="0" cy="0"/>
+        </a:xfrm>
+      </p:grpSpPr>
+      <p:sp>
+        <p:nvSpPr>
+          <p:cNvPr id="56" name="正方形/長方形 55">
+            <a:extLst>
+              <a:ext uri="{FF2B5EF4-FFF2-40B4-BE49-F238E27FC236}">
+                <a16:creationId xmlns:a16="http://schemas.microsoft.com/office/drawing/2014/main" id="{347B20E4-BBA6-994C-39E3-3B2997CF0853}"/>
+              </a:ext>
+            </a:extLst>
+          </p:cNvPr>
+          <p:cNvSpPr/>
+          <p:nvPr/>
+        </p:nvSpPr>
+        <p:spPr>
+          <a:xfrm>
+            <a:off x="387625" y="1864528"/>
+            <a:ext cx="7061603" cy="3214369"/>
+          </a:xfrm>
+          <a:prstGeom prst="rect">
+            <a:avLst/>
+          </a:prstGeom>
+          <a:solidFill>
+            <a:schemeClr val="bg2"/>
+          </a:solidFill>
+        </p:spPr>
+        <p:style>
+          <a:lnRef idx="2">
+            <a:schemeClr val="accent2">
+              <a:shade val="15000"/>
+            </a:schemeClr>
+          </a:lnRef>
+          <a:fillRef idx="1">
+            <a:schemeClr val="accent2"/>
+          </a:fillRef>
+          <a:effectRef idx="0">
+            <a:schemeClr val="accent2"/>
+          </a:effectRef>
+          <a:fontRef idx="minor">
+            <a:schemeClr val="lt1"/>
+          </a:fontRef>
+        </p:style>
+        <p:txBody>
+          <a:bodyPr rtlCol="0" anchor="t"/>
+          <a:lstStyle/>
+          <a:p>
+            <a:r>
+              <a:rPr kumimoji="1" lang="en-US" altLang="ja-JP" dirty="0" err="1">
+                <a:solidFill>
+                  <a:schemeClr val="tx1"/>
+                </a:solidFill>
+              </a:rPr>
+              <a:t>Tkinter</a:t>
+            </a:r>
+            <a:r>
+              <a:rPr kumimoji="1" lang="en-US" altLang="ja-JP" dirty="0">
+                <a:solidFill>
+                  <a:schemeClr val="tx1"/>
+                </a:solidFill>
+              </a:rPr>
+              <a:t> framework</a:t>
+            </a:r>
+            <a:endParaRPr kumimoji="1" lang="ja-JP" altLang="en-US" dirty="0">
+              <a:solidFill>
+                <a:schemeClr val="tx1"/>
+              </a:solidFill>
+            </a:endParaRPr>
+          </a:p>
+        </p:txBody>
+      </p:sp>
+      <p:sp>
+        <p:nvSpPr>
+          <p:cNvPr id="3" name="コンテンツ プレースホルダー 2">
+            <a:extLst>
+              <a:ext uri="{FF2B5EF4-FFF2-40B4-BE49-F238E27FC236}">
+                <a16:creationId xmlns:a16="http://schemas.microsoft.com/office/drawing/2014/main" id="{31FA3898-4248-B7E9-FF9A-58B87D1C78B1}"/>
+              </a:ext>
+            </a:extLst>
+          </p:cNvPr>
+          <p:cNvSpPr>
+            <a:spLocks noGrp="1"/>
+          </p:cNvSpPr>
+          <p:nvPr>
+            <p:ph idx="1"/>
+          </p:nvPr>
+        </p:nvSpPr>
+        <p:spPr>
+          <a:xfrm>
+            <a:off x="838200" y="1269036"/>
+            <a:ext cx="10515600" cy="4351338"/>
+          </a:xfrm>
+        </p:spPr>
+        <p:txBody>
+          <a:bodyPr/>
+          <a:lstStyle/>
+          <a:p>
+            <a:r>
+              <a:rPr lang="en-US" altLang="ja-JP" dirty="0"/>
+              <a:t>MVVM</a:t>
+            </a:r>
+            <a:r>
+              <a:rPr lang="ja-JP" altLang="en-US" dirty="0"/>
+              <a:t>（</a:t>
+            </a:r>
+            <a:r>
+              <a:rPr lang="en-US" altLang="ja-JP" dirty="0"/>
+              <a:t>MVP)</a:t>
+            </a:r>
+            <a:r>
+              <a:rPr lang="ja-JP" altLang="en-US" dirty="0"/>
+              <a:t>の構成</a:t>
+            </a:r>
+            <a:endParaRPr lang="en-US" altLang="ja-JP" dirty="0"/>
+          </a:p>
+        </p:txBody>
+      </p:sp>
+      <p:sp>
+        <p:nvSpPr>
+          <p:cNvPr id="6" name="タイトル 1">
+            <a:extLst>
+              <a:ext uri="{FF2B5EF4-FFF2-40B4-BE49-F238E27FC236}">
+                <a16:creationId xmlns:a16="http://schemas.microsoft.com/office/drawing/2014/main" id="{48F46185-C38B-571A-11AF-7EB27BE25588}"/>
+              </a:ext>
+            </a:extLst>
+          </p:cNvPr>
+          <p:cNvSpPr>
+            <a:spLocks noGrp="1"/>
+          </p:cNvSpPr>
+          <p:nvPr>
+            <p:ph type="title"/>
+          </p:nvPr>
+        </p:nvSpPr>
+        <p:spPr>
+          <a:xfrm>
+            <a:off x="838200" y="323757"/>
+            <a:ext cx="10515600" cy="1325563"/>
+          </a:xfrm>
+        </p:spPr>
+        <p:txBody>
+          <a:bodyPr/>
+          <a:lstStyle/>
+          <a:p>
+            <a:r>
+              <a:rPr lang="en-US" altLang="ja-JP" dirty="0"/>
+              <a:t>5. MVVM</a:t>
+            </a:r>
+            <a:r>
+              <a:rPr lang="ja-JP" altLang="en-US" dirty="0"/>
+              <a:t>パターンの複数画面ケース</a:t>
+            </a:r>
+            <a:endParaRPr kumimoji="1" lang="ja-JP" altLang="en-US" dirty="0"/>
+          </a:p>
+        </p:txBody>
+      </p:sp>
+      <p:sp>
+        <p:nvSpPr>
+          <p:cNvPr id="7" name="楕円 6">
+            <a:extLst>
+              <a:ext uri="{FF2B5EF4-FFF2-40B4-BE49-F238E27FC236}">
+                <a16:creationId xmlns:a16="http://schemas.microsoft.com/office/drawing/2014/main" id="{9B8FF63C-6C95-F5C8-6F61-8D656F59DE77}"/>
+              </a:ext>
+            </a:extLst>
+          </p:cNvPr>
+          <p:cNvSpPr/>
+          <p:nvPr/>
+        </p:nvSpPr>
+        <p:spPr>
+          <a:xfrm>
+            <a:off x="629115" y="2291579"/>
+            <a:ext cx="2969054" cy="1954992"/>
+          </a:xfrm>
+          <a:prstGeom prst="ellipse">
+            <a:avLst/>
+          </a:prstGeom>
+        </p:spPr>
+        <p:style>
+          <a:lnRef idx="2">
+            <a:schemeClr val="accent4">
+              <a:shade val="15000"/>
+            </a:schemeClr>
+          </a:lnRef>
+          <a:fillRef idx="1">
+            <a:schemeClr val="accent4"/>
+          </a:fillRef>
+          <a:effectRef idx="0">
+            <a:schemeClr val="accent4"/>
+          </a:effectRef>
+          <a:fontRef idx="minor">
+            <a:schemeClr val="lt1"/>
+          </a:fontRef>
+        </p:style>
+        <p:txBody>
+          <a:bodyPr rtlCol="0" anchor="ctr"/>
+          <a:lstStyle/>
+          <a:p>
+            <a:pPr algn="ctr"/>
+            <a:r>
+              <a:rPr kumimoji="1" lang="en-US" altLang="ja-JP" dirty="0" err="1"/>
+              <a:t>VrTopView</a:t>
+            </a:r>
+            <a:endParaRPr kumimoji="1" lang="en-US" altLang="ja-JP" dirty="0"/>
+          </a:p>
+          <a:p>
+            <a:pPr algn="ctr"/>
+            <a:endParaRPr kumimoji="1" lang="ja-JP" altLang="en-US" dirty="0"/>
+          </a:p>
+        </p:txBody>
+      </p:sp>
+      <p:sp>
+        <p:nvSpPr>
+          <p:cNvPr id="8" name="楕円 7">
+            <a:extLst>
+              <a:ext uri="{FF2B5EF4-FFF2-40B4-BE49-F238E27FC236}">
+                <a16:creationId xmlns:a16="http://schemas.microsoft.com/office/drawing/2014/main" id="{021E83C6-D1DA-8344-176D-F99CB788614E}"/>
+              </a:ext>
+            </a:extLst>
+          </p:cNvPr>
+          <p:cNvSpPr/>
+          <p:nvPr/>
+        </p:nvSpPr>
+        <p:spPr>
+          <a:xfrm>
+            <a:off x="4309238" y="2772409"/>
+            <a:ext cx="2862559" cy="976164"/>
+          </a:xfrm>
+          <a:prstGeom prst="ellipse">
+            <a:avLst/>
+          </a:prstGeom>
+        </p:spPr>
+        <p:style>
+          <a:lnRef idx="2">
+            <a:schemeClr val="accent5">
+              <a:shade val="15000"/>
+            </a:schemeClr>
+          </a:lnRef>
+          <a:fillRef idx="1">
+            <a:schemeClr val="accent5"/>
+          </a:fillRef>
+          <a:effectRef idx="0">
+            <a:schemeClr val="accent5"/>
+          </a:effectRef>
+          <a:fontRef idx="minor">
+            <a:schemeClr val="lt1"/>
+          </a:fontRef>
+        </p:style>
+        <p:txBody>
+          <a:bodyPr rtlCol="0" anchor="ctr"/>
+          <a:lstStyle/>
+          <a:p>
+            <a:pPr algn="ctr"/>
+            <a:r>
+              <a:rPr kumimoji="1" lang="en-US" altLang="ja-JP" dirty="0" err="1"/>
+              <a:t>VrTopViewModel</a:t>
+            </a:r>
+            <a:endParaRPr kumimoji="1" lang="en-US" altLang="ja-JP" dirty="0"/>
+          </a:p>
+        </p:txBody>
+      </p:sp>
+      <p:sp>
+        <p:nvSpPr>
+          <p:cNvPr id="9" name="楕円 8">
+            <a:extLst>
+              <a:ext uri="{FF2B5EF4-FFF2-40B4-BE49-F238E27FC236}">
+                <a16:creationId xmlns:a16="http://schemas.microsoft.com/office/drawing/2014/main" id="{F29A1DF0-1277-4363-24D2-B1D063AE0EC0}"/>
+              </a:ext>
+            </a:extLst>
+          </p:cNvPr>
+          <p:cNvSpPr/>
+          <p:nvPr/>
+        </p:nvSpPr>
+        <p:spPr>
+          <a:xfrm>
+            <a:off x="8517711" y="3251309"/>
+            <a:ext cx="2836089" cy="1025346"/>
+          </a:xfrm>
+          <a:prstGeom prst="ellipse">
+            <a:avLst/>
+          </a:prstGeom>
+        </p:spPr>
+        <p:style>
+          <a:lnRef idx="2">
+            <a:schemeClr val="accent3">
+              <a:shade val="15000"/>
+            </a:schemeClr>
+          </a:lnRef>
+          <a:fillRef idx="1">
+            <a:schemeClr val="accent3"/>
+          </a:fillRef>
+          <a:effectRef idx="0">
+            <a:schemeClr val="accent3"/>
+          </a:effectRef>
+          <a:fontRef idx="minor">
+            <a:schemeClr val="lt1"/>
+          </a:fontRef>
+        </p:style>
+        <p:txBody>
+          <a:bodyPr rtlCol="0" anchor="ctr"/>
+          <a:lstStyle/>
+          <a:p>
+            <a:pPr algn="ctr"/>
+            <a:r>
+              <a:rPr kumimoji="1" lang="en-US" altLang="ja-JP" dirty="0" err="1"/>
+              <a:t>VrSessionModel</a:t>
+            </a:r>
+            <a:endParaRPr kumimoji="1" lang="ja-JP" altLang="en-US" dirty="0"/>
+          </a:p>
+        </p:txBody>
+      </p:sp>
+      <p:cxnSp>
+        <p:nvCxnSpPr>
+          <p:cNvPr id="18" name="直線矢印コネクタ 17">
+            <a:extLst>
+              <a:ext uri="{FF2B5EF4-FFF2-40B4-BE49-F238E27FC236}">
+                <a16:creationId xmlns:a16="http://schemas.microsoft.com/office/drawing/2014/main" id="{98E6EB2F-34DF-E53C-D34F-0FAB3017EF19}"/>
+              </a:ext>
+            </a:extLst>
+          </p:cNvPr>
+          <p:cNvCxnSpPr>
+            <a:cxnSpLocks/>
+          </p:cNvCxnSpPr>
+          <p:nvPr/>
+        </p:nvCxnSpPr>
+        <p:spPr>
+          <a:xfrm>
+            <a:off x="3560541" y="3026580"/>
+            <a:ext cx="873584" cy="87732"/>
+          </a:xfrm>
+          <a:prstGeom prst="straightConnector1">
+            <a:avLst/>
+          </a:prstGeom>
+          <a:ln>
+            <a:tailEnd type="triangle"/>
+          </a:ln>
+        </p:spPr>
+        <p:style>
+          <a:lnRef idx="2">
+            <a:schemeClr val="accent1"/>
+          </a:lnRef>
+          <a:fillRef idx="0">
+            <a:schemeClr val="accent1"/>
+          </a:fillRef>
+          <a:effectRef idx="1">
+            <a:schemeClr val="accent1"/>
+          </a:effectRef>
+          <a:fontRef idx="minor">
+            <a:schemeClr val="tx1"/>
+          </a:fontRef>
+        </p:style>
+      </p:cxnSp>
+      <p:cxnSp>
+        <p:nvCxnSpPr>
+          <p:cNvPr id="21" name="直線矢印コネクタ 20">
+            <a:extLst>
+              <a:ext uri="{FF2B5EF4-FFF2-40B4-BE49-F238E27FC236}">
+                <a16:creationId xmlns:a16="http://schemas.microsoft.com/office/drawing/2014/main" id="{92006C9A-0CAF-2826-36FB-4732C9624AC6}"/>
+              </a:ext>
+            </a:extLst>
+          </p:cNvPr>
+          <p:cNvCxnSpPr>
+            <a:cxnSpLocks/>
+          </p:cNvCxnSpPr>
+          <p:nvPr/>
+        </p:nvCxnSpPr>
+        <p:spPr>
+          <a:xfrm flipH="1" flipV="1">
+            <a:off x="3615678" y="3333890"/>
+            <a:ext cx="795595" cy="78168"/>
+          </a:xfrm>
+          <a:prstGeom prst="straightConnector1">
+            <a:avLst/>
+          </a:prstGeom>
+          <a:ln>
+            <a:prstDash val="dash"/>
+            <a:tailEnd type="triangle"/>
+          </a:ln>
+        </p:spPr>
+        <p:style>
+          <a:lnRef idx="2">
+            <a:schemeClr val="accent1"/>
+          </a:lnRef>
+          <a:fillRef idx="0">
+            <a:schemeClr val="accent1"/>
+          </a:fillRef>
+          <a:effectRef idx="1">
+            <a:schemeClr val="accent1"/>
+          </a:effectRef>
+          <a:fontRef idx="minor">
+            <a:schemeClr val="tx1"/>
+          </a:fontRef>
+        </p:style>
+      </p:cxnSp>
+      <p:cxnSp>
+        <p:nvCxnSpPr>
+          <p:cNvPr id="26" name="直線矢印コネクタ 25">
+            <a:extLst>
+              <a:ext uri="{FF2B5EF4-FFF2-40B4-BE49-F238E27FC236}">
+                <a16:creationId xmlns:a16="http://schemas.microsoft.com/office/drawing/2014/main" id="{D7B9FA1A-8BF9-75DB-7570-428D39DF672C}"/>
+              </a:ext>
+            </a:extLst>
+          </p:cNvPr>
+          <p:cNvCxnSpPr>
+            <a:cxnSpLocks/>
+            <a:stCxn id="8" idx="6"/>
+          </p:cNvCxnSpPr>
+          <p:nvPr/>
+        </p:nvCxnSpPr>
+        <p:spPr>
+          <a:xfrm>
+            <a:off x="7171797" y="3260491"/>
+            <a:ext cx="1595344" cy="354221"/>
+          </a:xfrm>
+          <a:prstGeom prst="straightConnector1">
+            <a:avLst/>
+          </a:prstGeom>
+          <a:ln>
+            <a:tailEnd type="triangle"/>
+          </a:ln>
+        </p:spPr>
+        <p:style>
+          <a:lnRef idx="2">
+            <a:schemeClr val="accent1"/>
+          </a:lnRef>
+          <a:fillRef idx="0">
+            <a:schemeClr val="accent1"/>
+          </a:fillRef>
+          <a:effectRef idx="1">
+            <a:schemeClr val="accent1"/>
+          </a:effectRef>
+          <a:fontRef idx="minor">
+            <a:schemeClr val="tx1"/>
+          </a:fontRef>
+        </p:style>
+      </p:cxnSp>
+      <p:cxnSp>
+        <p:nvCxnSpPr>
+          <p:cNvPr id="27" name="直線矢印コネクタ 26">
+            <a:extLst>
+              <a:ext uri="{FF2B5EF4-FFF2-40B4-BE49-F238E27FC236}">
+                <a16:creationId xmlns:a16="http://schemas.microsoft.com/office/drawing/2014/main" id="{80A4DAC8-CABA-319E-6CFE-8E1B366FA373}"/>
+              </a:ext>
+            </a:extLst>
+          </p:cNvPr>
+          <p:cNvCxnSpPr>
+            <a:cxnSpLocks/>
+          </p:cNvCxnSpPr>
+          <p:nvPr/>
+        </p:nvCxnSpPr>
+        <p:spPr>
+          <a:xfrm flipH="1" flipV="1">
+            <a:off x="7009143" y="3518857"/>
+            <a:ext cx="1869124" cy="385199"/>
+          </a:xfrm>
+          <a:prstGeom prst="straightConnector1">
+            <a:avLst/>
+          </a:prstGeom>
+          <a:ln>
+            <a:prstDash val="dash"/>
+            <a:tailEnd type="triangle"/>
+          </a:ln>
+        </p:spPr>
+        <p:style>
+          <a:lnRef idx="2">
+            <a:schemeClr val="accent1"/>
+          </a:lnRef>
+          <a:fillRef idx="0">
+            <a:schemeClr val="accent1"/>
+          </a:fillRef>
+          <a:effectRef idx="1">
+            <a:schemeClr val="accent1"/>
+          </a:effectRef>
+          <a:fontRef idx="minor">
+            <a:schemeClr val="tx1"/>
+          </a:fontRef>
+        </p:style>
+      </p:cxnSp>
+      <p:pic>
+        <p:nvPicPr>
+          <p:cNvPr id="28" name="図 27">
+            <a:extLst>
+              <a:ext uri="{FF2B5EF4-FFF2-40B4-BE49-F238E27FC236}">
+                <a16:creationId xmlns:a16="http://schemas.microsoft.com/office/drawing/2014/main" id="{FF2FC98C-0D46-B34E-8654-89B0157CFD8D}"/>
+              </a:ext>
+            </a:extLst>
+          </p:cNvPr>
+          <p:cNvPicPr>
+            <a:picLocks noChangeAspect="1"/>
+          </p:cNvPicPr>
+          <p:nvPr/>
+        </p:nvPicPr>
+        <p:blipFill>
+          <a:blip r:embed="rId2"/>
+          <a:stretch>
+            <a:fillRect/>
+          </a:stretch>
+        </p:blipFill>
+        <p:spPr>
+          <a:xfrm>
+            <a:off x="646247" y="2543295"/>
+            <a:ext cx="2707192" cy="356857"/>
+          </a:xfrm>
+          <a:prstGeom prst="rect">
+            <a:avLst/>
+          </a:prstGeom>
+        </p:spPr>
+      </p:pic>
+      <p:sp>
+        <p:nvSpPr>
+          <p:cNvPr id="30" name="テキスト ボックス 29">
+            <a:extLst>
+              <a:ext uri="{FF2B5EF4-FFF2-40B4-BE49-F238E27FC236}">
+                <a16:creationId xmlns:a16="http://schemas.microsoft.com/office/drawing/2014/main" id="{9970539A-6466-2BE0-161A-528533CFB00D}"/>
+              </a:ext>
+            </a:extLst>
+          </p:cNvPr>
+          <p:cNvSpPr txBox="1"/>
+          <p:nvPr/>
+        </p:nvSpPr>
+        <p:spPr>
+          <a:xfrm>
+            <a:off x="3480529" y="2530820"/>
+            <a:ext cx="1680414" cy="738664"/>
+          </a:xfrm>
+          <a:prstGeom prst="rect">
+            <a:avLst/>
+          </a:prstGeom>
+          <a:noFill/>
+        </p:spPr>
+        <p:txBody>
+          <a:bodyPr wrap="square" rtlCol="0">
+            <a:spAutoFit/>
+          </a:bodyPr>
+          <a:lstStyle/>
+          <a:p>
+            <a:r>
+              <a:rPr kumimoji="1" lang="en-US" altLang="ja-JP" sz="1400" dirty="0"/>
+              <a:t>1-1.Start</a:t>
+            </a:r>
+          </a:p>
+          <a:p>
+            <a:r>
+              <a:rPr lang="en-US" altLang="ja-JP" sz="1400" dirty="0"/>
+              <a:t>1-2.</a:t>
+            </a:r>
+            <a:r>
+              <a:rPr lang="ja-JP" altLang="en-US" sz="1400" dirty="0"/>
+              <a:t>値の参照</a:t>
+            </a:r>
+            <a:r>
+              <a:rPr lang="en-US" altLang="ja-JP" sz="1400" dirty="0"/>
+              <a:t>/</a:t>
+            </a:r>
+            <a:r>
+              <a:rPr lang="ja-JP" altLang="en-US" sz="1400" dirty="0"/>
+              <a:t>監視</a:t>
+            </a:r>
+            <a:endParaRPr kumimoji="1" lang="en-US" altLang="ja-JP" sz="1400" dirty="0"/>
+          </a:p>
+          <a:p>
+            <a:endParaRPr kumimoji="1" lang="ja-JP" altLang="en-US" sz="1400" dirty="0"/>
+          </a:p>
+        </p:txBody>
+      </p:sp>
+      <p:cxnSp>
+        <p:nvCxnSpPr>
+          <p:cNvPr id="33" name="直線矢印コネクタ 32">
+            <a:extLst>
+              <a:ext uri="{FF2B5EF4-FFF2-40B4-BE49-F238E27FC236}">
+                <a16:creationId xmlns:a16="http://schemas.microsoft.com/office/drawing/2014/main" id="{5AC82FD8-8E16-9D6D-4CCE-A99FED522CB3}"/>
+              </a:ext>
+            </a:extLst>
+          </p:cNvPr>
+          <p:cNvCxnSpPr>
+            <a:cxnSpLocks/>
+          </p:cNvCxnSpPr>
+          <p:nvPr/>
+        </p:nvCxnSpPr>
+        <p:spPr>
+          <a:xfrm>
+            <a:off x="5136075" y="1698505"/>
+            <a:ext cx="428298" cy="0"/>
+          </a:xfrm>
+          <a:prstGeom prst="straightConnector1">
+            <a:avLst/>
+          </a:prstGeom>
+          <a:ln>
+            <a:tailEnd type="triangle"/>
+          </a:ln>
+        </p:spPr>
+        <p:style>
+          <a:lnRef idx="2">
+            <a:schemeClr val="accent1"/>
+          </a:lnRef>
+          <a:fillRef idx="0">
+            <a:schemeClr val="accent1"/>
+          </a:fillRef>
+          <a:effectRef idx="1">
+            <a:schemeClr val="accent1"/>
+          </a:effectRef>
+          <a:fontRef idx="minor">
+            <a:schemeClr val="tx1"/>
+          </a:fontRef>
+        </p:style>
+      </p:cxnSp>
+      <p:sp>
+        <p:nvSpPr>
+          <p:cNvPr id="34" name="テキスト ボックス 33">
+            <a:extLst>
+              <a:ext uri="{FF2B5EF4-FFF2-40B4-BE49-F238E27FC236}">
+                <a16:creationId xmlns:a16="http://schemas.microsoft.com/office/drawing/2014/main" id="{E778D66A-5366-6321-EA06-5476224C7C66}"/>
+              </a:ext>
+            </a:extLst>
+          </p:cNvPr>
+          <p:cNvSpPr txBox="1"/>
+          <p:nvPr/>
+        </p:nvSpPr>
+        <p:spPr>
+          <a:xfrm>
+            <a:off x="5564373" y="1495121"/>
+            <a:ext cx="1150697" cy="369332"/>
+          </a:xfrm>
+          <a:prstGeom prst="rect">
+            <a:avLst/>
+          </a:prstGeom>
+          <a:noFill/>
+        </p:spPr>
+        <p:txBody>
+          <a:bodyPr wrap="square" rtlCol="0">
+            <a:spAutoFit/>
+          </a:bodyPr>
+          <a:lstStyle/>
+          <a:p>
+            <a:r>
+              <a:rPr kumimoji="1" lang="en-US" altLang="ja-JP" dirty="0"/>
+              <a:t>API</a:t>
+            </a:r>
+            <a:endParaRPr kumimoji="1" lang="ja-JP" altLang="en-US" dirty="0"/>
+          </a:p>
+        </p:txBody>
+      </p:sp>
+      <p:cxnSp>
+        <p:nvCxnSpPr>
+          <p:cNvPr id="35" name="直線矢印コネクタ 34">
+            <a:extLst>
+              <a:ext uri="{FF2B5EF4-FFF2-40B4-BE49-F238E27FC236}">
+                <a16:creationId xmlns:a16="http://schemas.microsoft.com/office/drawing/2014/main" id="{87BFCDE8-A157-6CD6-7D12-D5F3251B07BD}"/>
+              </a:ext>
+            </a:extLst>
+          </p:cNvPr>
+          <p:cNvCxnSpPr>
+            <a:cxnSpLocks/>
+          </p:cNvCxnSpPr>
+          <p:nvPr/>
+        </p:nvCxnSpPr>
+        <p:spPr>
+          <a:xfrm flipH="1">
+            <a:off x="6450625" y="1700385"/>
+            <a:ext cx="388127" cy="0"/>
+          </a:xfrm>
+          <a:prstGeom prst="straightConnector1">
+            <a:avLst/>
+          </a:prstGeom>
+          <a:ln>
+            <a:prstDash val="dash"/>
+            <a:tailEnd type="triangle"/>
+          </a:ln>
+        </p:spPr>
+        <p:style>
+          <a:lnRef idx="2">
+            <a:schemeClr val="accent1"/>
+          </a:lnRef>
+          <a:fillRef idx="0">
+            <a:schemeClr val="accent1"/>
+          </a:fillRef>
+          <a:effectRef idx="1">
+            <a:schemeClr val="accent1"/>
+          </a:effectRef>
+          <a:fontRef idx="minor">
+            <a:schemeClr val="tx1"/>
+          </a:fontRef>
+        </p:style>
+      </p:cxnSp>
+      <p:sp>
+        <p:nvSpPr>
+          <p:cNvPr id="36" name="テキスト ボックス 35">
+            <a:extLst>
+              <a:ext uri="{FF2B5EF4-FFF2-40B4-BE49-F238E27FC236}">
+                <a16:creationId xmlns:a16="http://schemas.microsoft.com/office/drawing/2014/main" id="{24A3F56C-3855-1921-04FD-014844ECE899}"/>
+              </a:ext>
+            </a:extLst>
+          </p:cNvPr>
+          <p:cNvSpPr txBox="1"/>
+          <p:nvPr/>
+        </p:nvSpPr>
+        <p:spPr>
+          <a:xfrm>
+            <a:off x="6903967" y="1495196"/>
+            <a:ext cx="1150697" cy="369332"/>
+          </a:xfrm>
+          <a:prstGeom prst="rect">
+            <a:avLst/>
+          </a:prstGeom>
+          <a:noFill/>
+        </p:spPr>
+        <p:txBody>
+          <a:bodyPr wrap="square" rtlCol="0">
+            <a:spAutoFit/>
+          </a:bodyPr>
+          <a:lstStyle/>
+          <a:p>
+            <a:r>
+              <a:rPr kumimoji="1" lang="en-US" altLang="ja-JP" dirty="0"/>
+              <a:t>Callback</a:t>
+            </a:r>
+            <a:endParaRPr kumimoji="1" lang="ja-JP" altLang="en-US" dirty="0"/>
+          </a:p>
+        </p:txBody>
+      </p:sp>
+      <p:sp>
+        <p:nvSpPr>
+          <p:cNvPr id="4" name="楕円 3">
+            <a:extLst>
+              <a:ext uri="{FF2B5EF4-FFF2-40B4-BE49-F238E27FC236}">
+                <a16:creationId xmlns:a16="http://schemas.microsoft.com/office/drawing/2014/main" id="{94F7A2AA-AE99-36BB-206B-9FCE4CAB1AAE}"/>
+              </a:ext>
+            </a:extLst>
+          </p:cNvPr>
+          <p:cNvSpPr/>
+          <p:nvPr/>
+        </p:nvSpPr>
+        <p:spPr>
+          <a:xfrm>
+            <a:off x="1084520" y="3431858"/>
+            <a:ext cx="2025446" cy="583744"/>
+          </a:xfrm>
+          <a:prstGeom prst="ellipse">
+            <a:avLst/>
+          </a:prstGeom>
+        </p:spPr>
+        <p:style>
+          <a:lnRef idx="2">
+            <a:schemeClr val="accent1">
+              <a:shade val="15000"/>
+            </a:schemeClr>
+          </a:lnRef>
+          <a:fillRef idx="1">
+            <a:schemeClr val="accent1"/>
+          </a:fillRef>
+          <a:effectRef idx="0">
+            <a:schemeClr val="accent1"/>
+          </a:effectRef>
+          <a:fontRef idx="minor">
+            <a:schemeClr val="lt1"/>
+          </a:fontRef>
+        </p:style>
+        <p:txBody>
+          <a:bodyPr rtlCol="0" anchor="ctr"/>
+          <a:lstStyle/>
+          <a:p>
+            <a:pPr algn="ctr"/>
+            <a:r>
+              <a:rPr kumimoji="1" lang="en-US" altLang="ja-JP" dirty="0" err="1"/>
+              <a:t>VrHelpView</a:t>
+            </a:r>
+            <a:endParaRPr kumimoji="1" lang="ja-JP" altLang="en-US" dirty="0"/>
+          </a:p>
+        </p:txBody>
+      </p:sp>
+      <p:sp>
+        <p:nvSpPr>
+          <p:cNvPr id="42" name="楕円 41">
+            <a:extLst>
+              <a:ext uri="{FF2B5EF4-FFF2-40B4-BE49-F238E27FC236}">
+                <a16:creationId xmlns:a16="http://schemas.microsoft.com/office/drawing/2014/main" id="{F210CC45-69D0-3A46-CEF9-F837C23CEAFA}"/>
+              </a:ext>
+            </a:extLst>
+          </p:cNvPr>
+          <p:cNvSpPr/>
+          <p:nvPr/>
+        </p:nvSpPr>
+        <p:spPr>
+          <a:xfrm>
+            <a:off x="3208589" y="4145528"/>
+            <a:ext cx="2969053" cy="857751"/>
+          </a:xfrm>
+          <a:prstGeom prst="ellipse">
+            <a:avLst/>
+          </a:prstGeom>
+        </p:spPr>
+        <p:style>
+          <a:lnRef idx="2">
+            <a:schemeClr val="accent5">
+              <a:shade val="15000"/>
+            </a:schemeClr>
+          </a:lnRef>
+          <a:fillRef idx="1">
+            <a:schemeClr val="accent5"/>
+          </a:fillRef>
+          <a:effectRef idx="0">
+            <a:schemeClr val="accent5"/>
+          </a:effectRef>
+          <a:fontRef idx="minor">
+            <a:schemeClr val="lt1"/>
+          </a:fontRef>
+        </p:style>
+        <p:txBody>
+          <a:bodyPr rtlCol="0" anchor="ctr"/>
+          <a:lstStyle/>
+          <a:p>
+            <a:pPr algn="ctr"/>
+            <a:r>
+              <a:rPr kumimoji="1" lang="en-US" altLang="ja-JP" dirty="0" err="1"/>
+              <a:t>VrHelpViewModel</a:t>
+            </a:r>
+            <a:endParaRPr kumimoji="1" lang="en-US" altLang="ja-JP" dirty="0"/>
+          </a:p>
+        </p:txBody>
+      </p:sp>
+      <p:sp>
+        <p:nvSpPr>
+          <p:cNvPr id="55" name="テキスト ボックス 54">
+            <a:extLst>
+              <a:ext uri="{FF2B5EF4-FFF2-40B4-BE49-F238E27FC236}">
+                <a16:creationId xmlns:a16="http://schemas.microsoft.com/office/drawing/2014/main" id="{3168CAE9-6220-F85B-CE79-C01814A37A58}"/>
+              </a:ext>
+            </a:extLst>
+          </p:cNvPr>
+          <p:cNvSpPr txBox="1"/>
+          <p:nvPr/>
+        </p:nvSpPr>
+        <p:spPr>
+          <a:xfrm>
+            <a:off x="7584948" y="3135745"/>
+            <a:ext cx="1344847" cy="523220"/>
+          </a:xfrm>
+          <a:prstGeom prst="rect">
+            <a:avLst/>
+          </a:prstGeom>
+          <a:noFill/>
+        </p:spPr>
+        <p:txBody>
+          <a:bodyPr wrap="square" rtlCol="0">
+            <a:spAutoFit/>
+          </a:bodyPr>
+          <a:lstStyle/>
+          <a:p>
+            <a:r>
+              <a:rPr kumimoji="1" lang="en-US" altLang="ja-JP" sz="1400" dirty="0"/>
+              <a:t>1-3. Start</a:t>
+            </a:r>
+          </a:p>
+          <a:p>
+            <a:endParaRPr kumimoji="1" lang="ja-JP" altLang="en-US" sz="1400" dirty="0"/>
+          </a:p>
+        </p:txBody>
+      </p:sp>
+      <p:cxnSp>
+        <p:nvCxnSpPr>
+          <p:cNvPr id="68" name="直線矢印コネクタ 67">
+            <a:extLst>
+              <a:ext uri="{FF2B5EF4-FFF2-40B4-BE49-F238E27FC236}">
+                <a16:creationId xmlns:a16="http://schemas.microsoft.com/office/drawing/2014/main" id="{76A3D9E8-90DB-6BA2-BC4F-F9B6EEAE5FA1}"/>
+              </a:ext>
+            </a:extLst>
+          </p:cNvPr>
+          <p:cNvCxnSpPr>
+            <a:cxnSpLocks/>
+            <a:endCxn id="4" idx="5"/>
+          </p:cNvCxnSpPr>
+          <p:nvPr/>
+        </p:nvCxnSpPr>
+        <p:spPr>
+          <a:xfrm flipH="1" flipV="1">
+            <a:off x="2813346" y="3930115"/>
+            <a:ext cx="540093" cy="472922"/>
+          </a:xfrm>
+          <a:prstGeom prst="straightConnector1">
+            <a:avLst/>
+          </a:prstGeom>
+          <a:ln>
+            <a:prstDash val="dash"/>
+            <a:tailEnd type="triangle"/>
+          </a:ln>
+        </p:spPr>
+        <p:style>
+          <a:lnRef idx="2">
+            <a:schemeClr val="accent1"/>
+          </a:lnRef>
+          <a:fillRef idx="0">
+            <a:schemeClr val="accent1"/>
+          </a:fillRef>
+          <a:effectRef idx="1">
+            <a:schemeClr val="accent1"/>
+          </a:effectRef>
+          <a:fontRef idx="minor">
+            <a:schemeClr val="tx1"/>
+          </a:fontRef>
+        </p:style>
+      </p:cxnSp>
+      <p:cxnSp>
+        <p:nvCxnSpPr>
+          <p:cNvPr id="71" name="直線矢印コネクタ 70">
+            <a:extLst>
+              <a:ext uri="{FF2B5EF4-FFF2-40B4-BE49-F238E27FC236}">
+                <a16:creationId xmlns:a16="http://schemas.microsoft.com/office/drawing/2014/main" id="{B139D5EB-D89B-C1DA-DF61-7D37C561BEE7}"/>
+              </a:ext>
+            </a:extLst>
+          </p:cNvPr>
+          <p:cNvCxnSpPr>
+            <a:cxnSpLocks/>
+            <a:endCxn id="42" idx="1"/>
+          </p:cNvCxnSpPr>
+          <p:nvPr/>
+        </p:nvCxnSpPr>
+        <p:spPr>
+          <a:xfrm>
+            <a:off x="3063789" y="3792130"/>
+            <a:ext cx="579608" cy="479013"/>
+          </a:xfrm>
+          <a:prstGeom prst="straightConnector1">
+            <a:avLst/>
+          </a:prstGeom>
+          <a:ln>
+            <a:tailEnd type="triangle"/>
+          </a:ln>
+        </p:spPr>
+        <p:style>
+          <a:lnRef idx="2">
+            <a:schemeClr val="accent1"/>
+          </a:lnRef>
+          <a:fillRef idx="0">
+            <a:schemeClr val="accent1"/>
+          </a:fillRef>
+          <a:effectRef idx="1">
+            <a:schemeClr val="accent1"/>
+          </a:effectRef>
+          <a:fontRef idx="minor">
+            <a:schemeClr val="tx1"/>
+          </a:fontRef>
+        </p:style>
+      </p:cxnSp>
+      <p:sp>
+        <p:nvSpPr>
+          <p:cNvPr id="76" name="テキスト ボックス 75">
+            <a:extLst>
+              <a:ext uri="{FF2B5EF4-FFF2-40B4-BE49-F238E27FC236}">
+                <a16:creationId xmlns:a16="http://schemas.microsoft.com/office/drawing/2014/main" id="{F04CDD8A-B4CF-602B-54D9-8FE2772E098D}"/>
+              </a:ext>
+            </a:extLst>
+          </p:cNvPr>
+          <p:cNvSpPr txBox="1"/>
+          <p:nvPr/>
+        </p:nvSpPr>
+        <p:spPr>
+          <a:xfrm>
+            <a:off x="3292360" y="3377901"/>
+            <a:ext cx="2628376" cy="523220"/>
+          </a:xfrm>
+          <a:prstGeom prst="rect">
+            <a:avLst/>
+          </a:prstGeom>
+          <a:noFill/>
+        </p:spPr>
+        <p:txBody>
+          <a:bodyPr wrap="square" rtlCol="0">
+            <a:spAutoFit/>
+          </a:bodyPr>
+          <a:lstStyle/>
+          <a:p>
+            <a:r>
+              <a:rPr lang="en-US" altLang="ja-JP" sz="1400" dirty="0"/>
+              <a:t>2-2. </a:t>
+            </a:r>
+            <a:r>
+              <a:rPr lang="ja-JP" altLang="en-US" sz="1400" dirty="0"/>
+              <a:t>値の変化</a:t>
+            </a:r>
+          </a:p>
+          <a:p>
+            <a:r>
+              <a:rPr kumimoji="1" lang="en-US" altLang="ja-JP" sz="1400" dirty="0"/>
+              <a:t>(</a:t>
+            </a:r>
+            <a:r>
+              <a:rPr lang="ja-JP" altLang="en-US" sz="1400" dirty="0"/>
+              <a:t>ほぼ自動更新）</a:t>
+            </a:r>
+            <a:endParaRPr kumimoji="1" lang="ja-JP" altLang="en-US" sz="1400" dirty="0"/>
+          </a:p>
+        </p:txBody>
+      </p:sp>
+      <p:sp>
+        <p:nvSpPr>
+          <p:cNvPr id="77" name="テキスト ボックス 76">
+            <a:extLst>
+              <a:ext uri="{FF2B5EF4-FFF2-40B4-BE49-F238E27FC236}">
+                <a16:creationId xmlns:a16="http://schemas.microsoft.com/office/drawing/2014/main" id="{7BE332EB-EC14-C909-1E48-D56F792853BD}"/>
+              </a:ext>
+            </a:extLst>
+          </p:cNvPr>
+          <p:cNvSpPr txBox="1"/>
+          <p:nvPr/>
+        </p:nvSpPr>
+        <p:spPr>
+          <a:xfrm>
+            <a:off x="6631805" y="3552839"/>
+            <a:ext cx="2345915" cy="738664"/>
+          </a:xfrm>
+          <a:prstGeom prst="rect">
+            <a:avLst/>
+          </a:prstGeom>
+          <a:noFill/>
+        </p:spPr>
+        <p:txBody>
+          <a:bodyPr wrap="square" rtlCol="0">
+            <a:spAutoFit/>
+          </a:bodyPr>
+          <a:lstStyle/>
+          <a:p>
+            <a:r>
+              <a:rPr kumimoji="1" lang="en-US" altLang="ja-JP" sz="1400" dirty="0"/>
+              <a:t>2-1.Callback</a:t>
+            </a:r>
+          </a:p>
+          <a:p>
+            <a:r>
+              <a:rPr kumimoji="1" lang="en-US" altLang="ja-JP" sz="1400" dirty="0"/>
+              <a:t>(Screen, Status, Text)</a:t>
+            </a:r>
+          </a:p>
+          <a:p>
+            <a:endParaRPr kumimoji="1" lang="ja-JP" altLang="en-US" sz="1400" dirty="0"/>
+          </a:p>
+        </p:txBody>
+      </p:sp>
+      <p:sp>
+        <p:nvSpPr>
+          <p:cNvPr id="85" name="テキスト ボックス 84">
+            <a:extLst>
+              <a:ext uri="{FF2B5EF4-FFF2-40B4-BE49-F238E27FC236}">
+                <a16:creationId xmlns:a16="http://schemas.microsoft.com/office/drawing/2014/main" id="{5529568D-1802-B99D-0E50-5966EFA189FE}"/>
+              </a:ext>
+            </a:extLst>
+          </p:cNvPr>
+          <p:cNvSpPr txBox="1"/>
+          <p:nvPr/>
+        </p:nvSpPr>
+        <p:spPr>
+          <a:xfrm>
+            <a:off x="3416652" y="3904002"/>
+            <a:ext cx="2844280" cy="307777"/>
+          </a:xfrm>
+          <a:prstGeom prst="rect">
+            <a:avLst/>
+          </a:prstGeom>
+          <a:noFill/>
+        </p:spPr>
+        <p:txBody>
+          <a:bodyPr wrap="square" rtlCol="0">
+            <a:spAutoFit/>
+          </a:bodyPr>
+          <a:lstStyle/>
+          <a:p>
+            <a:r>
+              <a:rPr kumimoji="1" lang="en-US" altLang="ja-JP" sz="1400" dirty="0"/>
+              <a:t>1’-1.Start, </a:t>
+            </a:r>
+            <a:r>
+              <a:rPr lang="en-US" altLang="ja-JP" sz="1400" dirty="0"/>
+              <a:t>1’-2.</a:t>
+            </a:r>
+            <a:r>
+              <a:rPr lang="ja-JP" altLang="en-US" sz="1400" dirty="0"/>
+              <a:t>値の参照</a:t>
+            </a:r>
+            <a:r>
+              <a:rPr lang="en-US" altLang="ja-JP" sz="1400" dirty="0"/>
+              <a:t>/</a:t>
+            </a:r>
+            <a:r>
+              <a:rPr lang="ja-JP" altLang="en-US" sz="1400" dirty="0"/>
+              <a:t>監視</a:t>
+            </a:r>
+            <a:endParaRPr kumimoji="1" lang="en-US" altLang="ja-JP" sz="1400" dirty="0"/>
+          </a:p>
+        </p:txBody>
+      </p:sp>
+      <p:sp>
+        <p:nvSpPr>
+          <p:cNvPr id="86" name="楕円 85">
+            <a:extLst>
+              <a:ext uri="{FF2B5EF4-FFF2-40B4-BE49-F238E27FC236}">
+                <a16:creationId xmlns:a16="http://schemas.microsoft.com/office/drawing/2014/main" id="{EACE16AF-5582-EBB3-9636-C3AEB28F6071}"/>
+              </a:ext>
+            </a:extLst>
+          </p:cNvPr>
+          <p:cNvSpPr/>
+          <p:nvPr/>
+        </p:nvSpPr>
+        <p:spPr>
+          <a:xfrm>
+            <a:off x="7804762" y="4664413"/>
+            <a:ext cx="2836089" cy="553354"/>
+          </a:xfrm>
+          <a:prstGeom prst="ellipse">
+            <a:avLst/>
+          </a:prstGeom>
+        </p:spPr>
+        <p:style>
+          <a:lnRef idx="2">
+            <a:schemeClr val="accent3">
+              <a:shade val="15000"/>
+            </a:schemeClr>
+          </a:lnRef>
+          <a:fillRef idx="1">
+            <a:schemeClr val="accent3"/>
+          </a:fillRef>
+          <a:effectRef idx="0">
+            <a:schemeClr val="accent3"/>
+          </a:effectRef>
+          <a:fontRef idx="minor">
+            <a:schemeClr val="lt1"/>
+          </a:fontRef>
+        </p:style>
+        <p:txBody>
+          <a:bodyPr rtlCol="0" anchor="ctr"/>
+          <a:lstStyle/>
+          <a:p>
+            <a:pPr algn="ctr"/>
+            <a:r>
+              <a:rPr lang="en-US" altLang="ja-JP" dirty="0" err="1"/>
+              <a:t>VrVehicleModel</a:t>
+            </a:r>
+            <a:endParaRPr kumimoji="1" lang="ja-JP" altLang="en-US" dirty="0"/>
+          </a:p>
+        </p:txBody>
+      </p:sp>
+      <p:cxnSp>
+        <p:nvCxnSpPr>
+          <p:cNvPr id="87" name="直線矢印コネクタ 86">
+            <a:extLst>
+              <a:ext uri="{FF2B5EF4-FFF2-40B4-BE49-F238E27FC236}">
+                <a16:creationId xmlns:a16="http://schemas.microsoft.com/office/drawing/2014/main" id="{B2759226-656C-5C7B-5804-4E6BF3FCD9CE}"/>
+              </a:ext>
+            </a:extLst>
+          </p:cNvPr>
+          <p:cNvCxnSpPr>
+            <a:cxnSpLocks/>
+            <a:stCxn id="42" idx="6"/>
+          </p:cNvCxnSpPr>
+          <p:nvPr/>
+        </p:nvCxnSpPr>
+        <p:spPr>
+          <a:xfrm>
+            <a:off x="6177642" y="4574404"/>
+            <a:ext cx="1722161" cy="306046"/>
+          </a:xfrm>
+          <a:prstGeom prst="straightConnector1">
+            <a:avLst/>
+          </a:prstGeom>
+          <a:ln>
+            <a:tailEnd type="triangle"/>
+          </a:ln>
+        </p:spPr>
+        <p:style>
+          <a:lnRef idx="2">
+            <a:schemeClr val="accent1"/>
+          </a:lnRef>
+          <a:fillRef idx="0">
+            <a:schemeClr val="accent1"/>
+          </a:fillRef>
+          <a:effectRef idx="1">
+            <a:schemeClr val="accent1"/>
+          </a:effectRef>
+          <a:fontRef idx="minor">
+            <a:schemeClr val="tx1"/>
+          </a:fontRef>
+        </p:style>
+      </p:cxnSp>
+      <p:cxnSp>
+        <p:nvCxnSpPr>
+          <p:cNvPr id="88" name="直線矢印コネクタ 87">
+            <a:extLst>
+              <a:ext uri="{FF2B5EF4-FFF2-40B4-BE49-F238E27FC236}">
+                <a16:creationId xmlns:a16="http://schemas.microsoft.com/office/drawing/2014/main" id="{587E5729-C1EC-BBD4-BB71-897C98F9A601}"/>
+              </a:ext>
+            </a:extLst>
+          </p:cNvPr>
+          <p:cNvCxnSpPr>
+            <a:cxnSpLocks/>
+          </p:cNvCxnSpPr>
+          <p:nvPr/>
+        </p:nvCxnSpPr>
+        <p:spPr>
+          <a:xfrm flipH="1" flipV="1">
+            <a:off x="6014359" y="4758758"/>
+            <a:ext cx="1885444" cy="296170"/>
+          </a:xfrm>
+          <a:prstGeom prst="straightConnector1">
+            <a:avLst/>
+          </a:prstGeom>
+          <a:ln>
+            <a:prstDash val="dash"/>
+            <a:tailEnd type="triangle"/>
+          </a:ln>
+        </p:spPr>
+        <p:style>
+          <a:lnRef idx="2">
+            <a:schemeClr val="accent1"/>
+          </a:lnRef>
+          <a:fillRef idx="0">
+            <a:schemeClr val="accent1"/>
+          </a:fillRef>
+          <a:effectRef idx="1">
+            <a:schemeClr val="accent1"/>
+          </a:effectRef>
+          <a:fontRef idx="minor">
+            <a:schemeClr val="tx1"/>
+          </a:fontRef>
+        </p:style>
+      </p:cxnSp>
+      <p:sp>
+        <p:nvSpPr>
+          <p:cNvPr id="89" name="テキスト ボックス 88">
+            <a:extLst>
+              <a:ext uri="{FF2B5EF4-FFF2-40B4-BE49-F238E27FC236}">
+                <a16:creationId xmlns:a16="http://schemas.microsoft.com/office/drawing/2014/main" id="{437A57C1-1165-6FE8-B366-093770501523}"/>
+              </a:ext>
+            </a:extLst>
+          </p:cNvPr>
+          <p:cNvSpPr txBox="1"/>
+          <p:nvPr/>
+        </p:nvSpPr>
+        <p:spPr>
+          <a:xfrm>
+            <a:off x="6755289" y="4508912"/>
+            <a:ext cx="1344847" cy="523220"/>
+          </a:xfrm>
+          <a:prstGeom prst="rect">
+            <a:avLst/>
+          </a:prstGeom>
+          <a:noFill/>
+        </p:spPr>
+        <p:txBody>
+          <a:bodyPr wrap="square" rtlCol="0">
+            <a:spAutoFit/>
+          </a:bodyPr>
+          <a:lstStyle/>
+          <a:p>
+            <a:r>
+              <a:rPr kumimoji="1" lang="en-US" altLang="ja-JP" sz="1400" dirty="0"/>
+              <a:t>1’-3. </a:t>
+            </a:r>
+          </a:p>
+          <a:p>
+            <a:endParaRPr kumimoji="1" lang="ja-JP" altLang="en-US" sz="1400" dirty="0"/>
+          </a:p>
+        </p:txBody>
+      </p:sp>
+      <p:sp>
+        <p:nvSpPr>
+          <p:cNvPr id="90" name="テキスト ボックス 89">
+            <a:extLst>
+              <a:ext uri="{FF2B5EF4-FFF2-40B4-BE49-F238E27FC236}">
+                <a16:creationId xmlns:a16="http://schemas.microsoft.com/office/drawing/2014/main" id="{0047B1BF-CF9A-D3D8-8744-5809D24F081A}"/>
+              </a:ext>
+            </a:extLst>
+          </p:cNvPr>
+          <p:cNvSpPr txBox="1"/>
+          <p:nvPr/>
+        </p:nvSpPr>
+        <p:spPr>
+          <a:xfrm>
+            <a:off x="5754222" y="4735983"/>
+            <a:ext cx="2145582" cy="738664"/>
+          </a:xfrm>
+          <a:prstGeom prst="rect">
+            <a:avLst/>
+          </a:prstGeom>
+          <a:noFill/>
+        </p:spPr>
+        <p:txBody>
+          <a:bodyPr wrap="square" rtlCol="0">
+            <a:spAutoFit/>
+          </a:bodyPr>
+          <a:lstStyle/>
+          <a:p>
+            <a:r>
+              <a:rPr kumimoji="1" lang="en-US" altLang="ja-JP" sz="1400" dirty="0"/>
+              <a:t>2’-1.Callback</a:t>
+            </a:r>
+          </a:p>
+          <a:p>
+            <a:r>
+              <a:rPr kumimoji="1" lang="en-US" altLang="ja-JP" sz="1400" dirty="0"/>
+              <a:t>(</a:t>
+            </a:r>
+            <a:r>
+              <a:rPr kumimoji="1" lang="en-US" altLang="ja-JP" sz="1400" dirty="0" err="1"/>
+              <a:t>VehicleFunc</a:t>
+            </a:r>
+            <a:r>
+              <a:rPr kumimoji="1" lang="ja-JP" altLang="en-US" sz="1400" dirty="0"/>
+              <a:t>利用可否</a:t>
+            </a:r>
+            <a:r>
+              <a:rPr kumimoji="1" lang="en-US" altLang="ja-JP" sz="1400" dirty="0"/>
+              <a:t>)</a:t>
+            </a:r>
+          </a:p>
+          <a:p>
+            <a:endParaRPr kumimoji="1" lang="ja-JP" altLang="en-US" sz="1400" dirty="0"/>
+          </a:p>
+        </p:txBody>
+      </p:sp>
+      <p:sp>
+        <p:nvSpPr>
+          <p:cNvPr id="94" name="テキスト ボックス 93">
+            <a:extLst>
+              <a:ext uri="{FF2B5EF4-FFF2-40B4-BE49-F238E27FC236}">
+                <a16:creationId xmlns:a16="http://schemas.microsoft.com/office/drawing/2014/main" id="{DC66171C-3121-15E9-D3E6-EA0D880BD117}"/>
+              </a:ext>
+            </a:extLst>
+          </p:cNvPr>
+          <p:cNvSpPr txBox="1"/>
+          <p:nvPr/>
+        </p:nvSpPr>
+        <p:spPr>
+          <a:xfrm>
+            <a:off x="1997922" y="4163244"/>
+            <a:ext cx="2628376" cy="523220"/>
+          </a:xfrm>
+          <a:prstGeom prst="rect">
+            <a:avLst/>
+          </a:prstGeom>
+          <a:noFill/>
+        </p:spPr>
+        <p:txBody>
+          <a:bodyPr wrap="square" rtlCol="0">
+            <a:spAutoFit/>
+          </a:bodyPr>
+          <a:lstStyle/>
+          <a:p>
+            <a:r>
+              <a:rPr lang="en-US" altLang="ja-JP" sz="1400" dirty="0"/>
+              <a:t>2’-2. </a:t>
+            </a:r>
+            <a:r>
+              <a:rPr lang="ja-JP" altLang="en-US" sz="1400" dirty="0"/>
+              <a:t>値の変化</a:t>
+            </a:r>
+          </a:p>
+          <a:p>
+            <a:r>
+              <a:rPr kumimoji="1" lang="en-US" altLang="ja-JP" sz="1400" dirty="0"/>
+              <a:t>(</a:t>
+            </a:r>
+            <a:r>
+              <a:rPr lang="ja-JP" altLang="en-US" sz="1400" dirty="0"/>
+              <a:t>ほぼ自動更新）</a:t>
+            </a:r>
+            <a:endParaRPr kumimoji="1" lang="ja-JP" altLang="en-US" sz="1400" dirty="0"/>
+          </a:p>
+        </p:txBody>
+      </p:sp>
+      <p:sp>
+        <p:nvSpPr>
+          <p:cNvPr id="99" name="吹き出し: 四角形 98">
+            <a:extLst>
+              <a:ext uri="{FF2B5EF4-FFF2-40B4-BE49-F238E27FC236}">
+                <a16:creationId xmlns:a16="http://schemas.microsoft.com/office/drawing/2014/main" id="{12024BA4-433B-B20E-E7A5-A863AE413D01}"/>
+              </a:ext>
+            </a:extLst>
+          </p:cNvPr>
+          <p:cNvSpPr/>
+          <p:nvPr/>
+        </p:nvSpPr>
+        <p:spPr>
+          <a:xfrm>
+            <a:off x="460278" y="4415990"/>
+            <a:ext cx="1474431" cy="1740566"/>
+          </a:xfrm>
+          <a:prstGeom prst="wedgeRectCallout">
+            <a:avLst>
+              <a:gd name="adj1" fmla="val 29724"/>
+              <a:gd name="adj2" fmla="val -71121"/>
+            </a:avLst>
+          </a:prstGeom>
+        </p:spPr>
+        <p:style>
+          <a:lnRef idx="2">
+            <a:schemeClr val="accent1">
+              <a:shade val="15000"/>
+            </a:schemeClr>
+          </a:lnRef>
+          <a:fillRef idx="1">
+            <a:schemeClr val="accent1"/>
+          </a:fillRef>
+          <a:effectRef idx="0">
+            <a:schemeClr val="accent1"/>
+          </a:effectRef>
+          <a:fontRef idx="minor">
+            <a:schemeClr val="lt1"/>
+          </a:fontRef>
+        </p:style>
+        <p:txBody>
+          <a:bodyPr rtlCol="0" anchor="ctr"/>
+          <a:lstStyle/>
+          <a:p>
+            <a:pPr algn="ctr"/>
+            <a:endParaRPr kumimoji="1" lang="ja-JP" altLang="en-US"/>
+          </a:p>
+        </p:txBody>
+      </p:sp>
+      <p:pic>
+        <p:nvPicPr>
+          <p:cNvPr id="96" name="図 95">
+            <a:extLst>
+              <a:ext uri="{FF2B5EF4-FFF2-40B4-BE49-F238E27FC236}">
+                <a16:creationId xmlns:a16="http://schemas.microsoft.com/office/drawing/2014/main" id="{0317A8BC-2B08-7C16-836A-CFDF4E212C5F}"/>
+              </a:ext>
+            </a:extLst>
+          </p:cNvPr>
+          <p:cNvPicPr>
+            <a:picLocks noChangeAspect="1"/>
+          </p:cNvPicPr>
+          <p:nvPr/>
+        </p:nvPicPr>
+        <p:blipFill>
+          <a:blip r:embed="rId3"/>
+          <a:stretch>
+            <a:fillRect/>
+          </a:stretch>
+        </p:blipFill>
+        <p:spPr>
+          <a:xfrm>
+            <a:off x="587364" y="4299331"/>
+            <a:ext cx="1230369" cy="1559132"/>
+          </a:xfrm>
+          <a:prstGeom prst="rect">
+            <a:avLst/>
+          </a:prstGeom>
+          <a:ln>
+            <a:solidFill>
+              <a:schemeClr val="tx1"/>
+            </a:solidFill>
+          </a:ln>
+        </p:spPr>
+      </p:pic>
+      <p:pic>
+        <p:nvPicPr>
+          <p:cNvPr id="101" name="図 100">
+            <a:extLst>
+              <a:ext uri="{FF2B5EF4-FFF2-40B4-BE49-F238E27FC236}">
+                <a16:creationId xmlns:a16="http://schemas.microsoft.com/office/drawing/2014/main" id="{9199B2DB-B32D-E815-C06B-A9B18DF9147D}"/>
+              </a:ext>
+            </a:extLst>
+          </p:cNvPr>
+          <p:cNvPicPr>
+            <a:picLocks noChangeAspect="1"/>
+          </p:cNvPicPr>
+          <p:nvPr/>
+        </p:nvPicPr>
+        <p:blipFill>
+          <a:blip r:embed="rId4"/>
+          <a:stretch>
+            <a:fillRect/>
+          </a:stretch>
+        </p:blipFill>
+        <p:spPr>
+          <a:xfrm>
+            <a:off x="9355503" y="1256770"/>
+            <a:ext cx="2244617" cy="2287679"/>
+          </a:xfrm>
+          <a:prstGeom prst="rect">
+            <a:avLst/>
+          </a:prstGeom>
+        </p:spPr>
+      </p:pic>
+      <p:sp>
+        <p:nvSpPr>
+          <p:cNvPr id="102" name="吹き出し: 四角形 101">
+            <a:extLst>
+              <a:ext uri="{FF2B5EF4-FFF2-40B4-BE49-F238E27FC236}">
+                <a16:creationId xmlns:a16="http://schemas.microsoft.com/office/drawing/2014/main" id="{9A3BAC78-4764-D7D3-869A-31FFE3326B12}"/>
+              </a:ext>
+            </a:extLst>
+          </p:cNvPr>
+          <p:cNvSpPr/>
+          <p:nvPr/>
+        </p:nvSpPr>
+        <p:spPr>
+          <a:xfrm>
+            <a:off x="2113642" y="5391037"/>
+            <a:ext cx="6969864" cy="1353581"/>
+          </a:xfrm>
+          <a:prstGeom prst="wedgeRectCallout">
+            <a:avLst>
+              <a:gd name="adj1" fmla="val -21129"/>
+              <a:gd name="adj2" fmla="val -89686"/>
+            </a:avLst>
+          </a:prstGeom>
+        </p:spPr>
+        <p:style>
+          <a:lnRef idx="2">
+            <a:schemeClr val="accent4">
+              <a:shade val="15000"/>
+            </a:schemeClr>
+          </a:lnRef>
+          <a:fillRef idx="1">
+            <a:schemeClr val="accent4"/>
+          </a:fillRef>
+          <a:effectRef idx="0">
+            <a:schemeClr val="accent4"/>
+          </a:effectRef>
+          <a:fontRef idx="minor">
+            <a:schemeClr val="lt1"/>
+          </a:fontRef>
+        </p:style>
+        <p:txBody>
+          <a:bodyPr rtlCol="0" anchor="ctr"/>
+          <a:lstStyle/>
+          <a:p>
+            <a:pPr algn="ctr"/>
+            <a:r>
+              <a:rPr lang="en-US" altLang="ja-JP" dirty="0">
+                <a:solidFill>
+                  <a:srgbClr val="FFFF00"/>
+                </a:solidFill>
+              </a:rPr>
+              <a:t>【View </a:t>
+            </a:r>
+            <a:r>
+              <a:rPr lang="ja-JP" altLang="en-US" dirty="0">
+                <a:solidFill>
+                  <a:srgbClr val="FFFF00"/>
+                </a:solidFill>
+              </a:rPr>
+              <a:t>と </a:t>
+            </a:r>
+            <a:r>
+              <a:rPr lang="en-US" altLang="ja-JP" dirty="0" err="1">
+                <a:solidFill>
+                  <a:srgbClr val="FFFF00"/>
+                </a:solidFill>
+              </a:rPr>
+              <a:t>ViewModel</a:t>
+            </a:r>
+            <a:r>
+              <a:rPr lang="ja-JP" altLang="en-US" dirty="0">
+                <a:solidFill>
+                  <a:srgbClr val="FFFF00"/>
+                </a:solidFill>
+              </a:rPr>
+              <a:t>の関係性で分かったこと</a:t>
+            </a:r>
+            <a:r>
+              <a:rPr lang="en-US" altLang="ja-JP" dirty="0">
+                <a:solidFill>
+                  <a:srgbClr val="FFFF00"/>
+                </a:solidFill>
+              </a:rPr>
+              <a:t>】</a:t>
+            </a:r>
+          </a:p>
+          <a:p>
+            <a:pPr algn="ctr"/>
+            <a:r>
+              <a:rPr lang="en-US" altLang="ja-JP" dirty="0">
+                <a:solidFill>
+                  <a:srgbClr val="FFFF00"/>
+                </a:solidFill>
+              </a:rPr>
+              <a:t>View</a:t>
+            </a:r>
+            <a:r>
+              <a:rPr lang="ja-JP" altLang="en-US" dirty="0">
+                <a:solidFill>
+                  <a:srgbClr val="FFFF00"/>
+                </a:solidFill>
+              </a:rPr>
+              <a:t>と</a:t>
+            </a:r>
+            <a:r>
+              <a:rPr lang="en-US" altLang="ja-JP" dirty="0" err="1">
+                <a:solidFill>
+                  <a:srgbClr val="FFFF00"/>
+                </a:solidFill>
+              </a:rPr>
+              <a:t>ViewMode</a:t>
+            </a:r>
+            <a:r>
+              <a:rPr lang="ja-JP" altLang="en-US" dirty="0">
+                <a:solidFill>
+                  <a:srgbClr val="FFFF00"/>
+                </a:solidFill>
+              </a:rPr>
+              <a:t>は</a:t>
+            </a:r>
+            <a:r>
+              <a:rPr lang="ja-JP" altLang="en-US" b="1" dirty="0">
+                <a:solidFill>
+                  <a:srgbClr val="FFFF00"/>
+                </a:solidFill>
+              </a:rPr>
+              <a:t>生存期間が同じのため</a:t>
+            </a:r>
+            <a:r>
+              <a:rPr lang="en-US" altLang="ja-JP" dirty="0">
+                <a:solidFill>
+                  <a:srgbClr val="FFFF00"/>
+                </a:solidFill>
+              </a:rPr>
+              <a:t>1:1</a:t>
+            </a:r>
+            <a:r>
+              <a:rPr lang="ja-JP" altLang="en-US" dirty="0">
+                <a:solidFill>
+                  <a:srgbClr val="FFFF00"/>
+                </a:solidFill>
+              </a:rPr>
+              <a:t>が基本</a:t>
+            </a:r>
+            <a:endParaRPr lang="en-US" altLang="ja-JP" dirty="0">
+              <a:solidFill>
+                <a:srgbClr val="FFFF00"/>
+              </a:solidFill>
+            </a:endParaRPr>
+          </a:p>
+          <a:p>
+            <a:pPr algn="ctr"/>
+            <a:r>
+              <a:rPr kumimoji="1" lang="ja-JP" altLang="en-US" dirty="0">
+                <a:solidFill>
+                  <a:srgbClr val="FFFF00"/>
+                </a:solidFill>
+              </a:rPr>
+              <a:t>但し</a:t>
+            </a:r>
+            <a:r>
+              <a:rPr lang="ja-JP" altLang="en-US" dirty="0">
+                <a:solidFill>
+                  <a:srgbClr val="FFFF00"/>
+                </a:solidFill>
+              </a:rPr>
+              <a:t>複数個並行して存在することもあるし、</a:t>
+            </a:r>
+            <a:endParaRPr lang="en-US" altLang="ja-JP" dirty="0">
+              <a:solidFill>
+                <a:srgbClr val="FFFF00"/>
+              </a:solidFill>
+            </a:endParaRPr>
+          </a:p>
+          <a:p>
+            <a:pPr algn="ctr"/>
+            <a:r>
+              <a:rPr lang="ja-JP" altLang="en-US" dirty="0">
+                <a:solidFill>
+                  <a:srgbClr val="FFFF00"/>
+                </a:solidFill>
+              </a:rPr>
+              <a:t>状態を持たない</a:t>
+            </a:r>
+            <a:r>
+              <a:rPr lang="en-US" altLang="ja-JP" dirty="0">
+                <a:solidFill>
+                  <a:srgbClr val="FFFF00"/>
+                </a:solidFill>
+              </a:rPr>
+              <a:t>View</a:t>
+            </a:r>
+            <a:r>
+              <a:rPr lang="ja-JP" altLang="en-US" dirty="0">
+                <a:solidFill>
+                  <a:srgbClr val="FFFF00"/>
+                </a:solidFill>
+              </a:rPr>
+              <a:t>は</a:t>
+            </a:r>
+            <a:r>
+              <a:rPr lang="en-US" altLang="ja-JP" dirty="0" err="1">
+                <a:solidFill>
+                  <a:srgbClr val="FFFF00"/>
+                </a:solidFill>
+              </a:rPr>
+              <a:t>ViewModel</a:t>
+            </a:r>
+            <a:r>
+              <a:rPr lang="ja-JP" altLang="en-US" dirty="0">
+                <a:solidFill>
+                  <a:srgbClr val="FFFF00"/>
+                </a:solidFill>
+              </a:rPr>
+              <a:t>が無いものもある（参考程度）</a:t>
+            </a:r>
+            <a:endParaRPr lang="en-US" altLang="ja-JP" dirty="0">
+              <a:solidFill>
+                <a:srgbClr val="FFFF00"/>
+              </a:solidFill>
+            </a:endParaRPr>
+          </a:p>
+        </p:txBody>
+      </p:sp>
+    </p:spTree>
+    <p:extLst>
+      <p:ext uri="{BB962C8B-B14F-4D97-AF65-F5344CB8AC3E}">
+        <p14:creationId xmlns:p14="http://schemas.microsoft.com/office/powerpoint/2010/main" val="2617200253"/>
+      </p:ext>
+    </p:extLst>
+  </p:cSld>
+  <p:clrMapOvr>
+    <a:masterClrMapping/>
+  </p:clrMapOvr>
+</p:sld>
+</file>
+
+<file path=ppt/slides/slide12.xml><?xml version="1.0" encoding="utf-8"?>
+<p:sld xmlns:a="http://schemas.openxmlformats.org/drawingml/2006/main" xmlns:r="http://schemas.openxmlformats.org/officeDocument/2006/relationships" xmlns:p="http://schemas.openxmlformats.org/presentationml/2006/main">
+  <p:cSld>
+    <p:spTree>
+      <p:nvGrpSpPr>
+        <p:cNvPr id="1" name=""/>
+        <p:cNvGrpSpPr/>
+        <p:nvPr/>
+      </p:nvGrpSpPr>
+      <p:grpSpPr>
+        <a:xfrm>
+          <a:off x="0" y="0"/>
+          <a:ext cx="0" cy="0"/>
+          <a:chOff x="0" y="0"/>
+          <a:chExt cx="0" cy="0"/>
+        </a:xfrm>
+      </p:grpSpPr>
+      <p:sp>
+        <p:nvSpPr>
+          <p:cNvPr id="56" name="正方形/長方形 55">
+            <a:extLst>
+              <a:ext uri="{FF2B5EF4-FFF2-40B4-BE49-F238E27FC236}">
+                <a16:creationId xmlns:a16="http://schemas.microsoft.com/office/drawing/2014/main" id="{347B20E4-BBA6-994C-39E3-3B2997CF0853}"/>
+              </a:ext>
+            </a:extLst>
+          </p:cNvPr>
+          <p:cNvSpPr/>
+          <p:nvPr/>
+        </p:nvSpPr>
+        <p:spPr>
+          <a:xfrm>
+            <a:off x="387625" y="1864528"/>
+            <a:ext cx="7061603" cy="3214369"/>
+          </a:xfrm>
+          <a:prstGeom prst="rect">
+            <a:avLst/>
+          </a:prstGeom>
+          <a:solidFill>
+            <a:schemeClr val="bg2"/>
+          </a:solidFill>
+        </p:spPr>
+        <p:style>
+          <a:lnRef idx="2">
+            <a:schemeClr val="accent2">
+              <a:shade val="15000"/>
+            </a:schemeClr>
+          </a:lnRef>
+          <a:fillRef idx="1">
+            <a:schemeClr val="accent2"/>
+          </a:fillRef>
+          <a:effectRef idx="0">
+            <a:schemeClr val="accent2"/>
+          </a:effectRef>
+          <a:fontRef idx="minor">
+            <a:schemeClr val="lt1"/>
+          </a:fontRef>
+        </p:style>
+        <p:txBody>
+          <a:bodyPr rtlCol="0" anchor="t"/>
+          <a:lstStyle/>
+          <a:p>
+            <a:r>
+              <a:rPr kumimoji="1" lang="en-US" altLang="ja-JP" dirty="0" err="1">
+                <a:solidFill>
+                  <a:schemeClr val="tx1"/>
+                </a:solidFill>
+              </a:rPr>
+              <a:t>Tkinter</a:t>
+            </a:r>
+            <a:r>
+              <a:rPr kumimoji="1" lang="en-US" altLang="ja-JP" dirty="0">
+                <a:solidFill>
+                  <a:schemeClr val="tx1"/>
+                </a:solidFill>
+              </a:rPr>
+              <a:t> framework</a:t>
+            </a:r>
+            <a:endParaRPr kumimoji="1" lang="ja-JP" altLang="en-US" dirty="0">
+              <a:solidFill>
+                <a:schemeClr val="tx1"/>
+              </a:solidFill>
+            </a:endParaRPr>
+          </a:p>
+        </p:txBody>
+      </p:sp>
+      <p:sp>
+        <p:nvSpPr>
+          <p:cNvPr id="3" name="コンテンツ プレースホルダー 2">
+            <a:extLst>
+              <a:ext uri="{FF2B5EF4-FFF2-40B4-BE49-F238E27FC236}">
+                <a16:creationId xmlns:a16="http://schemas.microsoft.com/office/drawing/2014/main" id="{31FA3898-4248-B7E9-FF9A-58B87D1C78B1}"/>
+              </a:ext>
+            </a:extLst>
+          </p:cNvPr>
+          <p:cNvSpPr>
+            <a:spLocks noGrp="1"/>
+          </p:cNvSpPr>
+          <p:nvPr>
+            <p:ph idx="1"/>
+          </p:nvPr>
+        </p:nvSpPr>
+        <p:spPr>
+          <a:xfrm>
+            <a:off x="838200" y="1269036"/>
+            <a:ext cx="10515600" cy="4351338"/>
+          </a:xfrm>
+        </p:spPr>
+        <p:txBody>
+          <a:bodyPr/>
+          <a:lstStyle/>
+          <a:p>
+            <a:r>
+              <a:rPr lang="en-US" altLang="ja-JP" dirty="0"/>
+              <a:t>MVVM + CPP</a:t>
+            </a:r>
+            <a:r>
+              <a:rPr lang="ja-JP" altLang="en-US" dirty="0"/>
+              <a:t>構成</a:t>
+            </a:r>
+            <a:endParaRPr lang="en-US" altLang="ja-JP" dirty="0"/>
+          </a:p>
+        </p:txBody>
+      </p:sp>
+      <p:sp>
+        <p:nvSpPr>
+          <p:cNvPr id="6" name="タイトル 1">
+            <a:extLst>
+              <a:ext uri="{FF2B5EF4-FFF2-40B4-BE49-F238E27FC236}">
+                <a16:creationId xmlns:a16="http://schemas.microsoft.com/office/drawing/2014/main" id="{48F46185-C38B-571A-11AF-7EB27BE25588}"/>
+              </a:ext>
+            </a:extLst>
+          </p:cNvPr>
+          <p:cNvSpPr>
+            <a:spLocks noGrp="1"/>
+          </p:cNvSpPr>
+          <p:nvPr>
+            <p:ph type="title"/>
+          </p:nvPr>
+        </p:nvSpPr>
+        <p:spPr>
+          <a:xfrm>
+            <a:off x="838200" y="323757"/>
+            <a:ext cx="11158330" cy="1325563"/>
+          </a:xfrm>
+        </p:spPr>
+        <p:txBody>
+          <a:bodyPr/>
+          <a:lstStyle/>
+          <a:p>
+            <a:r>
+              <a:rPr lang="en-US" altLang="ja-JP" dirty="0"/>
+              <a:t>6. MVVM</a:t>
+            </a:r>
+            <a:r>
+              <a:rPr lang="ja-JP" altLang="en-US" dirty="0"/>
+              <a:t>パターンの複数画面ケース</a:t>
+            </a:r>
+            <a:r>
+              <a:rPr lang="en-US" altLang="ja-JP" dirty="0"/>
+              <a:t>(</a:t>
+            </a:r>
+            <a:r>
+              <a:rPr lang="ja-JP" altLang="en-US" dirty="0"/>
+              <a:t>＋</a:t>
+            </a:r>
+            <a:r>
+              <a:rPr lang="en-US" altLang="ja-JP" dirty="0"/>
+              <a:t>α</a:t>
+            </a:r>
+            <a:r>
+              <a:rPr lang="ja-JP" altLang="en-US" dirty="0"/>
+              <a:t>）</a:t>
+            </a:r>
+            <a:endParaRPr kumimoji="1" lang="ja-JP" altLang="en-US" dirty="0"/>
+          </a:p>
+        </p:txBody>
+      </p:sp>
+      <p:sp>
+        <p:nvSpPr>
+          <p:cNvPr id="7" name="楕円 6">
+            <a:extLst>
+              <a:ext uri="{FF2B5EF4-FFF2-40B4-BE49-F238E27FC236}">
+                <a16:creationId xmlns:a16="http://schemas.microsoft.com/office/drawing/2014/main" id="{9B8FF63C-6C95-F5C8-6F61-8D656F59DE77}"/>
+              </a:ext>
+            </a:extLst>
+          </p:cNvPr>
+          <p:cNvSpPr/>
+          <p:nvPr/>
+        </p:nvSpPr>
+        <p:spPr>
+          <a:xfrm>
+            <a:off x="629115" y="2291579"/>
+            <a:ext cx="2969054" cy="1954992"/>
+          </a:xfrm>
+          <a:prstGeom prst="ellipse">
+            <a:avLst/>
+          </a:prstGeom>
+        </p:spPr>
+        <p:style>
+          <a:lnRef idx="2">
+            <a:schemeClr val="accent4">
+              <a:shade val="15000"/>
+            </a:schemeClr>
+          </a:lnRef>
+          <a:fillRef idx="1">
+            <a:schemeClr val="accent4"/>
+          </a:fillRef>
+          <a:effectRef idx="0">
+            <a:schemeClr val="accent4"/>
+          </a:effectRef>
+          <a:fontRef idx="minor">
+            <a:schemeClr val="lt1"/>
+          </a:fontRef>
+        </p:style>
+        <p:txBody>
+          <a:bodyPr rtlCol="0" anchor="ctr"/>
+          <a:lstStyle/>
+          <a:p>
+            <a:pPr algn="ctr"/>
+            <a:r>
+              <a:rPr kumimoji="1" lang="en-US" altLang="ja-JP" dirty="0" err="1"/>
+              <a:t>VrTopView</a:t>
+            </a:r>
+            <a:endParaRPr kumimoji="1" lang="en-US" altLang="ja-JP" dirty="0"/>
+          </a:p>
+          <a:p>
+            <a:pPr algn="ctr"/>
+            <a:endParaRPr kumimoji="1" lang="ja-JP" altLang="en-US" dirty="0"/>
+          </a:p>
+        </p:txBody>
+      </p:sp>
+      <p:sp>
+        <p:nvSpPr>
+          <p:cNvPr id="8" name="楕円 7">
+            <a:extLst>
+              <a:ext uri="{FF2B5EF4-FFF2-40B4-BE49-F238E27FC236}">
+                <a16:creationId xmlns:a16="http://schemas.microsoft.com/office/drawing/2014/main" id="{021E83C6-D1DA-8344-176D-F99CB788614E}"/>
+              </a:ext>
+            </a:extLst>
+          </p:cNvPr>
+          <p:cNvSpPr/>
+          <p:nvPr/>
+        </p:nvSpPr>
+        <p:spPr>
+          <a:xfrm>
+            <a:off x="4309238" y="2772409"/>
+            <a:ext cx="2862559" cy="976164"/>
+          </a:xfrm>
+          <a:prstGeom prst="ellipse">
+            <a:avLst/>
+          </a:prstGeom>
+        </p:spPr>
+        <p:style>
+          <a:lnRef idx="2">
+            <a:schemeClr val="accent5">
+              <a:shade val="15000"/>
+            </a:schemeClr>
+          </a:lnRef>
+          <a:fillRef idx="1">
+            <a:schemeClr val="accent5"/>
+          </a:fillRef>
+          <a:effectRef idx="0">
+            <a:schemeClr val="accent5"/>
+          </a:effectRef>
+          <a:fontRef idx="minor">
+            <a:schemeClr val="lt1"/>
+          </a:fontRef>
+        </p:style>
+        <p:txBody>
+          <a:bodyPr rtlCol="0" anchor="ctr"/>
+          <a:lstStyle/>
+          <a:p>
+            <a:pPr algn="ctr"/>
+            <a:r>
+              <a:rPr kumimoji="1" lang="en-US" altLang="ja-JP" dirty="0" err="1"/>
+              <a:t>VrTopViewModel</a:t>
+            </a:r>
+            <a:endParaRPr kumimoji="1" lang="en-US" altLang="ja-JP" dirty="0"/>
+          </a:p>
+        </p:txBody>
+      </p:sp>
+      <p:sp>
+        <p:nvSpPr>
+          <p:cNvPr id="9" name="楕円 8">
+            <a:extLst>
+              <a:ext uri="{FF2B5EF4-FFF2-40B4-BE49-F238E27FC236}">
+                <a16:creationId xmlns:a16="http://schemas.microsoft.com/office/drawing/2014/main" id="{F29A1DF0-1277-4363-24D2-B1D063AE0EC0}"/>
+              </a:ext>
+            </a:extLst>
+          </p:cNvPr>
+          <p:cNvSpPr/>
+          <p:nvPr/>
+        </p:nvSpPr>
+        <p:spPr>
+          <a:xfrm>
+            <a:off x="8517711" y="3251309"/>
+            <a:ext cx="2836089" cy="1025346"/>
+          </a:xfrm>
+          <a:prstGeom prst="ellipse">
+            <a:avLst/>
+          </a:prstGeom>
+        </p:spPr>
+        <p:style>
+          <a:lnRef idx="2">
+            <a:schemeClr val="accent3">
+              <a:shade val="15000"/>
+            </a:schemeClr>
+          </a:lnRef>
+          <a:fillRef idx="1">
+            <a:schemeClr val="accent3"/>
+          </a:fillRef>
+          <a:effectRef idx="0">
+            <a:schemeClr val="accent3"/>
+          </a:effectRef>
+          <a:fontRef idx="minor">
+            <a:schemeClr val="lt1"/>
+          </a:fontRef>
+        </p:style>
+        <p:txBody>
+          <a:bodyPr rtlCol="0" anchor="ctr"/>
+          <a:lstStyle/>
+          <a:p>
+            <a:pPr algn="ctr"/>
+            <a:r>
+              <a:rPr kumimoji="1" lang="en-US" altLang="ja-JP" dirty="0" err="1"/>
+              <a:t>VrSessionModel</a:t>
+            </a:r>
+            <a:endParaRPr kumimoji="1" lang="ja-JP" altLang="en-US" dirty="0"/>
+          </a:p>
+        </p:txBody>
+      </p:sp>
+      <p:cxnSp>
+        <p:nvCxnSpPr>
+          <p:cNvPr id="18" name="直線矢印コネクタ 17">
+            <a:extLst>
+              <a:ext uri="{FF2B5EF4-FFF2-40B4-BE49-F238E27FC236}">
+                <a16:creationId xmlns:a16="http://schemas.microsoft.com/office/drawing/2014/main" id="{98E6EB2F-34DF-E53C-D34F-0FAB3017EF19}"/>
+              </a:ext>
+            </a:extLst>
+          </p:cNvPr>
+          <p:cNvCxnSpPr>
+            <a:cxnSpLocks/>
+          </p:cNvCxnSpPr>
+          <p:nvPr/>
+        </p:nvCxnSpPr>
+        <p:spPr>
+          <a:xfrm>
+            <a:off x="3560541" y="3026580"/>
+            <a:ext cx="873584" cy="87732"/>
+          </a:xfrm>
+          <a:prstGeom prst="straightConnector1">
+            <a:avLst/>
+          </a:prstGeom>
+          <a:ln>
+            <a:tailEnd type="triangle"/>
+          </a:ln>
+        </p:spPr>
+        <p:style>
+          <a:lnRef idx="2">
+            <a:schemeClr val="accent1"/>
+          </a:lnRef>
+          <a:fillRef idx="0">
+            <a:schemeClr val="accent1"/>
+          </a:fillRef>
+          <a:effectRef idx="1">
+            <a:schemeClr val="accent1"/>
+          </a:effectRef>
+          <a:fontRef idx="minor">
+            <a:schemeClr val="tx1"/>
+          </a:fontRef>
+        </p:style>
+      </p:cxnSp>
+      <p:cxnSp>
+        <p:nvCxnSpPr>
+          <p:cNvPr id="21" name="直線矢印コネクタ 20">
+            <a:extLst>
+              <a:ext uri="{FF2B5EF4-FFF2-40B4-BE49-F238E27FC236}">
+                <a16:creationId xmlns:a16="http://schemas.microsoft.com/office/drawing/2014/main" id="{92006C9A-0CAF-2826-36FB-4732C9624AC6}"/>
+              </a:ext>
+            </a:extLst>
+          </p:cNvPr>
+          <p:cNvCxnSpPr>
+            <a:cxnSpLocks/>
+          </p:cNvCxnSpPr>
+          <p:nvPr/>
+        </p:nvCxnSpPr>
+        <p:spPr>
+          <a:xfrm flipH="1" flipV="1">
+            <a:off x="3615678" y="3333890"/>
+            <a:ext cx="795595" cy="78168"/>
+          </a:xfrm>
+          <a:prstGeom prst="straightConnector1">
+            <a:avLst/>
+          </a:prstGeom>
+          <a:ln>
+            <a:prstDash val="dash"/>
+            <a:tailEnd type="triangle"/>
+          </a:ln>
+        </p:spPr>
+        <p:style>
+          <a:lnRef idx="2">
+            <a:schemeClr val="accent1"/>
+          </a:lnRef>
+          <a:fillRef idx="0">
+            <a:schemeClr val="accent1"/>
+          </a:fillRef>
+          <a:effectRef idx="1">
+            <a:schemeClr val="accent1"/>
+          </a:effectRef>
+          <a:fontRef idx="minor">
+            <a:schemeClr val="tx1"/>
+          </a:fontRef>
+        </p:style>
+      </p:cxnSp>
+      <p:cxnSp>
+        <p:nvCxnSpPr>
+          <p:cNvPr id="26" name="直線矢印コネクタ 25">
+            <a:extLst>
+              <a:ext uri="{FF2B5EF4-FFF2-40B4-BE49-F238E27FC236}">
+                <a16:creationId xmlns:a16="http://schemas.microsoft.com/office/drawing/2014/main" id="{D7B9FA1A-8BF9-75DB-7570-428D39DF672C}"/>
+              </a:ext>
+            </a:extLst>
+          </p:cNvPr>
+          <p:cNvCxnSpPr>
+            <a:cxnSpLocks/>
+            <a:stCxn id="8" idx="6"/>
+          </p:cNvCxnSpPr>
+          <p:nvPr/>
+        </p:nvCxnSpPr>
+        <p:spPr>
+          <a:xfrm>
+            <a:off x="7171797" y="3260491"/>
+            <a:ext cx="1595344" cy="354221"/>
+          </a:xfrm>
+          <a:prstGeom prst="straightConnector1">
+            <a:avLst/>
+          </a:prstGeom>
+          <a:ln>
+            <a:tailEnd type="triangle"/>
+          </a:ln>
+        </p:spPr>
+        <p:style>
+          <a:lnRef idx="2">
+            <a:schemeClr val="accent1"/>
+          </a:lnRef>
+          <a:fillRef idx="0">
+            <a:schemeClr val="accent1"/>
+          </a:fillRef>
+          <a:effectRef idx="1">
+            <a:schemeClr val="accent1"/>
+          </a:effectRef>
+          <a:fontRef idx="minor">
+            <a:schemeClr val="tx1"/>
+          </a:fontRef>
+        </p:style>
+      </p:cxnSp>
+      <p:cxnSp>
+        <p:nvCxnSpPr>
+          <p:cNvPr id="27" name="直線矢印コネクタ 26">
+            <a:extLst>
+              <a:ext uri="{FF2B5EF4-FFF2-40B4-BE49-F238E27FC236}">
+                <a16:creationId xmlns:a16="http://schemas.microsoft.com/office/drawing/2014/main" id="{80A4DAC8-CABA-319E-6CFE-8E1B366FA373}"/>
+              </a:ext>
+            </a:extLst>
+          </p:cNvPr>
+          <p:cNvCxnSpPr>
+            <a:cxnSpLocks/>
+          </p:cNvCxnSpPr>
+          <p:nvPr/>
+        </p:nvCxnSpPr>
+        <p:spPr>
+          <a:xfrm flipH="1" flipV="1">
+            <a:off x="7009143" y="3518857"/>
+            <a:ext cx="1869124" cy="385199"/>
+          </a:xfrm>
+          <a:prstGeom prst="straightConnector1">
+            <a:avLst/>
+          </a:prstGeom>
+          <a:ln>
+            <a:prstDash val="dash"/>
+            <a:tailEnd type="triangle"/>
+          </a:ln>
+        </p:spPr>
+        <p:style>
+          <a:lnRef idx="2">
+            <a:schemeClr val="accent1"/>
+          </a:lnRef>
+          <a:fillRef idx="0">
+            <a:schemeClr val="accent1"/>
+          </a:fillRef>
+          <a:effectRef idx="1">
+            <a:schemeClr val="accent1"/>
+          </a:effectRef>
+          <a:fontRef idx="minor">
+            <a:schemeClr val="tx1"/>
+          </a:fontRef>
+        </p:style>
+      </p:cxnSp>
+      <p:pic>
+        <p:nvPicPr>
+          <p:cNvPr id="28" name="図 27">
+            <a:extLst>
+              <a:ext uri="{FF2B5EF4-FFF2-40B4-BE49-F238E27FC236}">
+                <a16:creationId xmlns:a16="http://schemas.microsoft.com/office/drawing/2014/main" id="{FF2FC98C-0D46-B34E-8654-89B0157CFD8D}"/>
+              </a:ext>
+            </a:extLst>
+          </p:cNvPr>
+          <p:cNvPicPr>
+            <a:picLocks noChangeAspect="1"/>
+          </p:cNvPicPr>
+          <p:nvPr/>
+        </p:nvPicPr>
+        <p:blipFill>
+          <a:blip r:embed="rId2"/>
+          <a:stretch>
+            <a:fillRect/>
+          </a:stretch>
+        </p:blipFill>
+        <p:spPr>
+          <a:xfrm>
+            <a:off x="646247" y="2543295"/>
+            <a:ext cx="2707192" cy="356857"/>
+          </a:xfrm>
+          <a:prstGeom prst="rect">
+            <a:avLst/>
+          </a:prstGeom>
+        </p:spPr>
+      </p:pic>
+      <p:sp>
+        <p:nvSpPr>
+          <p:cNvPr id="30" name="テキスト ボックス 29">
+            <a:extLst>
+              <a:ext uri="{FF2B5EF4-FFF2-40B4-BE49-F238E27FC236}">
+                <a16:creationId xmlns:a16="http://schemas.microsoft.com/office/drawing/2014/main" id="{9970539A-6466-2BE0-161A-528533CFB00D}"/>
+              </a:ext>
+            </a:extLst>
+          </p:cNvPr>
+          <p:cNvSpPr txBox="1"/>
+          <p:nvPr/>
+        </p:nvSpPr>
+        <p:spPr>
+          <a:xfrm>
+            <a:off x="3480529" y="2530820"/>
+            <a:ext cx="1680414" cy="738664"/>
+          </a:xfrm>
+          <a:prstGeom prst="rect">
+            <a:avLst/>
+          </a:prstGeom>
+          <a:noFill/>
+        </p:spPr>
+        <p:txBody>
+          <a:bodyPr wrap="square" rtlCol="0">
+            <a:spAutoFit/>
+          </a:bodyPr>
+          <a:lstStyle/>
+          <a:p>
+            <a:r>
+              <a:rPr kumimoji="1" lang="en-US" altLang="ja-JP" sz="1400" dirty="0"/>
+              <a:t>1-1.Start</a:t>
+            </a:r>
+          </a:p>
+          <a:p>
+            <a:r>
+              <a:rPr lang="en-US" altLang="ja-JP" sz="1400" dirty="0"/>
+              <a:t>1-2.</a:t>
+            </a:r>
+            <a:r>
+              <a:rPr lang="ja-JP" altLang="en-US" sz="1400" dirty="0"/>
+              <a:t>値の参照</a:t>
+            </a:r>
+            <a:r>
+              <a:rPr lang="en-US" altLang="ja-JP" sz="1400" dirty="0"/>
+              <a:t>/</a:t>
+            </a:r>
+            <a:r>
+              <a:rPr lang="ja-JP" altLang="en-US" sz="1400" dirty="0"/>
+              <a:t>監視</a:t>
+            </a:r>
+            <a:endParaRPr kumimoji="1" lang="en-US" altLang="ja-JP" sz="1400" dirty="0"/>
+          </a:p>
+          <a:p>
+            <a:endParaRPr kumimoji="1" lang="ja-JP" altLang="en-US" sz="1400" dirty="0"/>
+          </a:p>
+        </p:txBody>
+      </p:sp>
+      <p:cxnSp>
+        <p:nvCxnSpPr>
+          <p:cNvPr id="33" name="直線矢印コネクタ 32">
+            <a:extLst>
+              <a:ext uri="{FF2B5EF4-FFF2-40B4-BE49-F238E27FC236}">
+                <a16:creationId xmlns:a16="http://schemas.microsoft.com/office/drawing/2014/main" id="{5AC82FD8-8E16-9D6D-4CCE-A99FED522CB3}"/>
+              </a:ext>
+            </a:extLst>
+          </p:cNvPr>
+          <p:cNvCxnSpPr>
+            <a:cxnSpLocks/>
+          </p:cNvCxnSpPr>
+          <p:nvPr/>
+        </p:nvCxnSpPr>
+        <p:spPr>
+          <a:xfrm>
+            <a:off x="5136075" y="1698505"/>
+            <a:ext cx="428298" cy="0"/>
+          </a:xfrm>
+          <a:prstGeom prst="straightConnector1">
+            <a:avLst/>
+          </a:prstGeom>
+          <a:ln>
+            <a:tailEnd type="triangle"/>
+          </a:ln>
+        </p:spPr>
+        <p:style>
+          <a:lnRef idx="2">
+            <a:schemeClr val="accent1"/>
+          </a:lnRef>
+          <a:fillRef idx="0">
+            <a:schemeClr val="accent1"/>
+          </a:fillRef>
+          <a:effectRef idx="1">
+            <a:schemeClr val="accent1"/>
+          </a:effectRef>
+          <a:fontRef idx="minor">
+            <a:schemeClr val="tx1"/>
+          </a:fontRef>
+        </p:style>
+      </p:cxnSp>
+      <p:sp>
+        <p:nvSpPr>
+          <p:cNvPr id="34" name="テキスト ボックス 33">
+            <a:extLst>
+              <a:ext uri="{FF2B5EF4-FFF2-40B4-BE49-F238E27FC236}">
+                <a16:creationId xmlns:a16="http://schemas.microsoft.com/office/drawing/2014/main" id="{E778D66A-5366-6321-EA06-5476224C7C66}"/>
+              </a:ext>
+            </a:extLst>
+          </p:cNvPr>
+          <p:cNvSpPr txBox="1"/>
+          <p:nvPr/>
+        </p:nvSpPr>
+        <p:spPr>
+          <a:xfrm>
+            <a:off x="5564373" y="1495121"/>
+            <a:ext cx="1150697" cy="369332"/>
+          </a:xfrm>
+          <a:prstGeom prst="rect">
+            <a:avLst/>
+          </a:prstGeom>
+          <a:noFill/>
+        </p:spPr>
+        <p:txBody>
+          <a:bodyPr wrap="square" rtlCol="0">
+            <a:spAutoFit/>
+          </a:bodyPr>
+          <a:lstStyle/>
+          <a:p>
+            <a:r>
+              <a:rPr kumimoji="1" lang="en-US" altLang="ja-JP" dirty="0"/>
+              <a:t>API</a:t>
+            </a:r>
+            <a:endParaRPr kumimoji="1" lang="ja-JP" altLang="en-US" dirty="0"/>
+          </a:p>
+        </p:txBody>
+      </p:sp>
+      <p:cxnSp>
+        <p:nvCxnSpPr>
+          <p:cNvPr id="35" name="直線矢印コネクタ 34">
+            <a:extLst>
+              <a:ext uri="{FF2B5EF4-FFF2-40B4-BE49-F238E27FC236}">
+                <a16:creationId xmlns:a16="http://schemas.microsoft.com/office/drawing/2014/main" id="{87BFCDE8-A157-6CD6-7D12-D5F3251B07BD}"/>
+              </a:ext>
+            </a:extLst>
+          </p:cNvPr>
+          <p:cNvCxnSpPr>
+            <a:cxnSpLocks/>
+          </p:cNvCxnSpPr>
+          <p:nvPr/>
+        </p:nvCxnSpPr>
+        <p:spPr>
+          <a:xfrm flipH="1">
+            <a:off x="6450625" y="1700385"/>
+            <a:ext cx="388127" cy="0"/>
+          </a:xfrm>
+          <a:prstGeom prst="straightConnector1">
+            <a:avLst/>
+          </a:prstGeom>
+          <a:ln>
+            <a:prstDash val="dash"/>
+            <a:tailEnd type="triangle"/>
+          </a:ln>
+        </p:spPr>
+        <p:style>
+          <a:lnRef idx="2">
+            <a:schemeClr val="accent1"/>
+          </a:lnRef>
+          <a:fillRef idx="0">
+            <a:schemeClr val="accent1"/>
+          </a:fillRef>
+          <a:effectRef idx="1">
+            <a:schemeClr val="accent1"/>
+          </a:effectRef>
+          <a:fontRef idx="minor">
+            <a:schemeClr val="tx1"/>
+          </a:fontRef>
+        </p:style>
+      </p:cxnSp>
+      <p:sp>
+        <p:nvSpPr>
+          <p:cNvPr id="36" name="テキスト ボックス 35">
+            <a:extLst>
+              <a:ext uri="{FF2B5EF4-FFF2-40B4-BE49-F238E27FC236}">
+                <a16:creationId xmlns:a16="http://schemas.microsoft.com/office/drawing/2014/main" id="{24A3F56C-3855-1921-04FD-014844ECE899}"/>
+              </a:ext>
+            </a:extLst>
+          </p:cNvPr>
+          <p:cNvSpPr txBox="1"/>
+          <p:nvPr/>
+        </p:nvSpPr>
+        <p:spPr>
+          <a:xfrm>
+            <a:off x="6903967" y="1495196"/>
+            <a:ext cx="1150697" cy="369332"/>
+          </a:xfrm>
+          <a:prstGeom prst="rect">
+            <a:avLst/>
+          </a:prstGeom>
+          <a:noFill/>
+        </p:spPr>
+        <p:txBody>
+          <a:bodyPr wrap="square" rtlCol="0">
+            <a:spAutoFit/>
+          </a:bodyPr>
+          <a:lstStyle/>
+          <a:p>
+            <a:r>
+              <a:rPr kumimoji="1" lang="en-US" altLang="ja-JP" dirty="0"/>
+              <a:t>Callback</a:t>
+            </a:r>
+            <a:endParaRPr kumimoji="1" lang="ja-JP" altLang="en-US" dirty="0"/>
+          </a:p>
+        </p:txBody>
+      </p:sp>
+      <p:sp>
+        <p:nvSpPr>
+          <p:cNvPr id="4" name="楕円 3">
+            <a:extLst>
+              <a:ext uri="{FF2B5EF4-FFF2-40B4-BE49-F238E27FC236}">
+                <a16:creationId xmlns:a16="http://schemas.microsoft.com/office/drawing/2014/main" id="{94F7A2AA-AE99-36BB-206B-9FCE4CAB1AAE}"/>
+              </a:ext>
+            </a:extLst>
+          </p:cNvPr>
+          <p:cNvSpPr/>
+          <p:nvPr/>
+        </p:nvSpPr>
+        <p:spPr>
+          <a:xfrm>
+            <a:off x="1084520" y="3431858"/>
+            <a:ext cx="2025446" cy="583744"/>
+          </a:xfrm>
+          <a:prstGeom prst="ellipse">
+            <a:avLst/>
+          </a:prstGeom>
+        </p:spPr>
+        <p:style>
+          <a:lnRef idx="2">
+            <a:schemeClr val="accent1">
+              <a:shade val="15000"/>
+            </a:schemeClr>
+          </a:lnRef>
+          <a:fillRef idx="1">
+            <a:schemeClr val="accent1"/>
+          </a:fillRef>
+          <a:effectRef idx="0">
+            <a:schemeClr val="accent1"/>
+          </a:effectRef>
+          <a:fontRef idx="minor">
+            <a:schemeClr val="lt1"/>
+          </a:fontRef>
+        </p:style>
+        <p:txBody>
+          <a:bodyPr rtlCol="0" anchor="ctr"/>
+          <a:lstStyle/>
+          <a:p>
+            <a:pPr algn="ctr"/>
+            <a:r>
+              <a:rPr kumimoji="1" lang="en-US" altLang="ja-JP" dirty="0" err="1"/>
+              <a:t>VrHelpView</a:t>
+            </a:r>
+            <a:endParaRPr kumimoji="1" lang="ja-JP" altLang="en-US" dirty="0"/>
+          </a:p>
+        </p:txBody>
+      </p:sp>
+      <p:sp>
+        <p:nvSpPr>
+          <p:cNvPr id="42" name="楕円 41">
+            <a:extLst>
+              <a:ext uri="{FF2B5EF4-FFF2-40B4-BE49-F238E27FC236}">
+                <a16:creationId xmlns:a16="http://schemas.microsoft.com/office/drawing/2014/main" id="{F210CC45-69D0-3A46-CEF9-F837C23CEAFA}"/>
+              </a:ext>
+            </a:extLst>
+          </p:cNvPr>
+          <p:cNvSpPr/>
+          <p:nvPr/>
+        </p:nvSpPr>
+        <p:spPr>
+          <a:xfrm>
+            <a:off x="3208589" y="4145528"/>
+            <a:ext cx="2969053" cy="857751"/>
+          </a:xfrm>
+          <a:prstGeom prst="ellipse">
+            <a:avLst/>
+          </a:prstGeom>
+        </p:spPr>
+        <p:style>
+          <a:lnRef idx="2">
+            <a:schemeClr val="accent5">
+              <a:shade val="15000"/>
+            </a:schemeClr>
+          </a:lnRef>
+          <a:fillRef idx="1">
+            <a:schemeClr val="accent5"/>
+          </a:fillRef>
+          <a:effectRef idx="0">
+            <a:schemeClr val="accent5"/>
+          </a:effectRef>
+          <a:fontRef idx="minor">
+            <a:schemeClr val="lt1"/>
+          </a:fontRef>
+        </p:style>
+        <p:txBody>
+          <a:bodyPr rtlCol="0" anchor="ctr"/>
+          <a:lstStyle/>
+          <a:p>
+            <a:pPr algn="ctr"/>
+            <a:r>
+              <a:rPr kumimoji="1" lang="en-US" altLang="ja-JP" dirty="0" err="1"/>
+              <a:t>VrHelpViewModel</a:t>
+            </a:r>
+            <a:endParaRPr kumimoji="1" lang="en-US" altLang="ja-JP" dirty="0"/>
+          </a:p>
+        </p:txBody>
+      </p:sp>
+      <p:sp>
+        <p:nvSpPr>
+          <p:cNvPr id="55" name="テキスト ボックス 54">
+            <a:extLst>
+              <a:ext uri="{FF2B5EF4-FFF2-40B4-BE49-F238E27FC236}">
+                <a16:creationId xmlns:a16="http://schemas.microsoft.com/office/drawing/2014/main" id="{3168CAE9-6220-F85B-CE79-C01814A37A58}"/>
+              </a:ext>
+            </a:extLst>
+          </p:cNvPr>
+          <p:cNvSpPr txBox="1"/>
+          <p:nvPr/>
+        </p:nvSpPr>
+        <p:spPr>
+          <a:xfrm>
+            <a:off x="7584948" y="3135745"/>
+            <a:ext cx="1344847" cy="523220"/>
+          </a:xfrm>
+          <a:prstGeom prst="rect">
+            <a:avLst/>
+          </a:prstGeom>
+          <a:noFill/>
+        </p:spPr>
+        <p:txBody>
+          <a:bodyPr wrap="square" rtlCol="0">
+            <a:spAutoFit/>
+          </a:bodyPr>
+          <a:lstStyle/>
+          <a:p>
+            <a:r>
+              <a:rPr kumimoji="1" lang="en-US" altLang="ja-JP" sz="1400" dirty="0"/>
+              <a:t>1-3. Start</a:t>
+            </a:r>
+          </a:p>
+          <a:p>
+            <a:endParaRPr kumimoji="1" lang="ja-JP" altLang="en-US" sz="1400" dirty="0"/>
+          </a:p>
+        </p:txBody>
+      </p:sp>
+      <p:cxnSp>
+        <p:nvCxnSpPr>
+          <p:cNvPr id="68" name="直線矢印コネクタ 67">
+            <a:extLst>
+              <a:ext uri="{FF2B5EF4-FFF2-40B4-BE49-F238E27FC236}">
+                <a16:creationId xmlns:a16="http://schemas.microsoft.com/office/drawing/2014/main" id="{76A3D9E8-90DB-6BA2-BC4F-F9B6EEAE5FA1}"/>
+              </a:ext>
+            </a:extLst>
+          </p:cNvPr>
+          <p:cNvCxnSpPr>
+            <a:cxnSpLocks/>
+            <a:endCxn id="4" idx="5"/>
+          </p:cNvCxnSpPr>
+          <p:nvPr/>
+        </p:nvCxnSpPr>
+        <p:spPr>
+          <a:xfrm flipH="1" flipV="1">
+            <a:off x="2813346" y="3930115"/>
+            <a:ext cx="540093" cy="472922"/>
+          </a:xfrm>
+          <a:prstGeom prst="straightConnector1">
+            <a:avLst/>
+          </a:prstGeom>
+          <a:ln>
+            <a:prstDash val="dash"/>
+            <a:tailEnd type="triangle"/>
+          </a:ln>
+        </p:spPr>
+        <p:style>
+          <a:lnRef idx="2">
+            <a:schemeClr val="accent1"/>
+          </a:lnRef>
+          <a:fillRef idx="0">
+            <a:schemeClr val="accent1"/>
+          </a:fillRef>
+          <a:effectRef idx="1">
+            <a:schemeClr val="accent1"/>
+          </a:effectRef>
+          <a:fontRef idx="minor">
+            <a:schemeClr val="tx1"/>
+          </a:fontRef>
+        </p:style>
+      </p:cxnSp>
+      <p:cxnSp>
+        <p:nvCxnSpPr>
+          <p:cNvPr id="71" name="直線矢印コネクタ 70">
+            <a:extLst>
+              <a:ext uri="{FF2B5EF4-FFF2-40B4-BE49-F238E27FC236}">
+                <a16:creationId xmlns:a16="http://schemas.microsoft.com/office/drawing/2014/main" id="{B139D5EB-D89B-C1DA-DF61-7D37C561BEE7}"/>
+              </a:ext>
+            </a:extLst>
+          </p:cNvPr>
+          <p:cNvCxnSpPr>
+            <a:cxnSpLocks/>
+            <a:endCxn id="42" idx="1"/>
+          </p:cNvCxnSpPr>
+          <p:nvPr/>
+        </p:nvCxnSpPr>
+        <p:spPr>
+          <a:xfrm>
+            <a:off x="3063789" y="3792130"/>
+            <a:ext cx="579608" cy="479013"/>
+          </a:xfrm>
+          <a:prstGeom prst="straightConnector1">
+            <a:avLst/>
+          </a:prstGeom>
+          <a:ln>
+            <a:tailEnd type="triangle"/>
+          </a:ln>
+        </p:spPr>
+        <p:style>
+          <a:lnRef idx="2">
+            <a:schemeClr val="accent1"/>
+          </a:lnRef>
+          <a:fillRef idx="0">
+            <a:schemeClr val="accent1"/>
+          </a:fillRef>
+          <a:effectRef idx="1">
+            <a:schemeClr val="accent1"/>
+          </a:effectRef>
+          <a:fontRef idx="minor">
+            <a:schemeClr val="tx1"/>
+          </a:fontRef>
+        </p:style>
+      </p:cxnSp>
+      <p:sp>
+        <p:nvSpPr>
+          <p:cNvPr id="76" name="テキスト ボックス 75">
+            <a:extLst>
+              <a:ext uri="{FF2B5EF4-FFF2-40B4-BE49-F238E27FC236}">
+                <a16:creationId xmlns:a16="http://schemas.microsoft.com/office/drawing/2014/main" id="{F04CDD8A-B4CF-602B-54D9-8FE2772E098D}"/>
+              </a:ext>
+            </a:extLst>
+          </p:cNvPr>
+          <p:cNvSpPr txBox="1"/>
+          <p:nvPr/>
+        </p:nvSpPr>
+        <p:spPr>
+          <a:xfrm>
+            <a:off x="3292360" y="3377901"/>
+            <a:ext cx="2628376" cy="523220"/>
+          </a:xfrm>
+          <a:prstGeom prst="rect">
+            <a:avLst/>
+          </a:prstGeom>
+          <a:noFill/>
+        </p:spPr>
+        <p:txBody>
+          <a:bodyPr wrap="square" rtlCol="0">
+            <a:spAutoFit/>
+          </a:bodyPr>
+          <a:lstStyle/>
+          <a:p>
+            <a:r>
+              <a:rPr lang="en-US" altLang="ja-JP" sz="1400" dirty="0"/>
+              <a:t>2-2. </a:t>
+            </a:r>
+            <a:r>
+              <a:rPr lang="ja-JP" altLang="en-US" sz="1400" dirty="0"/>
+              <a:t>値の変化</a:t>
+            </a:r>
+          </a:p>
+          <a:p>
+            <a:r>
+              <a:rPr kumimoji="1" lang="en-US" altLang="ja-JP" sz="1400" dirty="0"/>
+              <a:t>(</a:t>
+            </a:r>
+            <a:r>
+              <a:rPr lang="ja-JP" altLang="en-US" sz="1400" dirty="0"/>
+              <a:t>ほぼ自動更新）</a:t>
+            </a:r>
+            <a:endParaRPr kumimoji="1" lang="ja-JP" altLang="en-US" sz="1400" dirty="0"/>
+          </a:p>
+        </p:txBody>
+      </p:sp>
+      <p:sp>
+        <p:nvSpPr>
+          <p:cNvPr id="77" name="テキスト ボックス 76">
+            <a:extLst>
+              <a:ext uri="{FF2B5EF4-FFF2-40B4-BE49-F238E27FC236}">
+                <a16:creationId xmlns:a16="http://schemas.microsoft.com/office/drawing/2014/main" id="{7BE332EB-EC14-C909-1E48-D56F792853BD}"/>
+              </a:ext>
+            </a:extLst>
+          </p:cNvPr>
+          <p:cNvSpPr txBox="1"/>
+          <p:nvPr/>
+        </p:nvSpPr>
+        <p:spPr>
+          <a:xfrm>
+            <a:off x="6631805" y="3552839"/>
+            <a:ext cx="2345915" cy="738664"/>
+          </a:xfrm>
+          <a:prstGeom prst="rect">
+            <a:avLst/>
+          </a:prstGeom>
+          <a:noFill/>
+        </p:spPr>
+        <p:txBody>
+          <a:bodyPr wrap="square" rtlCol="0">
+            <a:spAutoFit/>
+          </a:bodyPr>
+          <a:lstStyle/>
+          <a:p>
+            <a:r>
+              <a:rPr kumimoji="1" lang="en-US" altLang="ja-JP" sz="1400" dirty="0"/>
+              <a:t>2-1.Callback</a:t>
+            </a:r>
+          </a:p>
+          <a:p>
+            <a:r>
+              <a:rPr kumimoji="1" lang="en-US" altLang="ja-JP" sz="1400" dirty="0"/>
+              <a:t>(Screen, Status, Text)</a:t>
+            </a:r>
+          </a:p>
+          <a:p>
+            <a:endParaRPr kumimoji="1" lang="ja-JP" altLang="en-US" sz="1400" dirty="0"/>
+          </a:p>
+        </p:txBody>
+      </p:sp>
+      <p:sp>
+        <p:nvSpPr>
+          <p:cNvPr id="85" name="テキスト ボックス 84">
+            <a:extLst>
+              <a:ext uri="{FF2B5EF4-FFF2-40B4-BE49-F238E27FC236}">
+                <a16:creationId xmlns:a16="http://schemas.microsoft.com/office/drawing/2014/main" id="{5529568D-1802-B99D-0E50-5966EFA189FE}"/>
+              </a:ext>
+            </a:extLst>
+          </p:cNvPr>
+          <p:cNvSpPr txBox="1"/>
+          <p:nvPr/>
+        </p:nvSpPr>
+        <p:spPr>
+          <a:xfrm>
+            <a:off x="3416652" y="3904002"/>
+            <a:ext cx="2844280" cy="307777"/>
+          </a:xfrm>
+          <a:prstGeom prst="rect">
+            <a:avLst/>
+          </a:prstGeom>
+          <a:noFill/>
+        </p:spPr>
+        <p:txBody>
+          <a:bodyPr wrap="square" rtlCol="0">
+            <a:spAutoFit/>
+          </a:bodyPr>
+          <a:lstStyle/>
+          <a:p>
+            <a:r>
+              <a:rPr kumimoji="1" lang="en-US" altLang="ja-JP" sz="1400" dirty="0"/>
+              <a:t>1’-1.Start, </a:t>
+            </a:r>
+            <a:r>
+              <a:rPr lang="en-US" altLang="ja-JP" sz="1400" dirty="0"/>
+              <a:t>1’-2.</a:t>
+            </a:r>
+            <a:r>
+              <a:rPr lang="ja-JP" altLang="en-US" sz="1400" dirty="0"/>
+              <a:t>値の参照</a:t>
+            </a:r>
+            <a:r>
+              <a:rPr lang="en-US" altLang="ja-JP" sz="1400" dirty="0"/>
+              <a:t>/</a:t>
+            </a:r>
+            <a:r>
+              <a:rPr lang="ja-JP" altLang="en-US" sz="1400" dirty="0"/>
+              <a:t>監視</a:t>
+            </a:r>
+            <a:endParaRPr kumimoji="1" lang="en-US" altLang="ja-JP" sz="1400" dirty="0"/>
+          </a:p>
+        </p:txBody>
+      </p:sp>
+      <p:sp>
+        <p:nvSpPr>
+          <p:cNvPr id="86" name="楕円 85">
+            <a:extLst>
+              <a:ext uri="{FF2B5EF4-FFF2-40B4-BE49-F238E27FC236}">
+                <a16:creationId xmlns:a16="http://schemas.microsoft.com/office/drawing/2014/main" id="{EACE16AF-5582-EBB3-9636-C3AEB28F6071}"/>
+              </a:ext>
+            </a:extLst>
+          </p:cNvPr>
+          <p:cNvSpPr/>
+          <p:nvPr/>
+        </p:nvSpPr>
+        <p:spPr>
+          <a:xfrm>
+            <a:off x="7804762" y="4664413"/>
+            <a:ext cx="2836089" cy="553354"/>
+          </a:xfrm>
+          <a:prstGeom prst="ellipse">
+            <a:avLst/>
+          </a:prstGeom>
+        </p:spPr>
+        <p:style>
+          <a:lnRef idx="2">
+            <a:schemeClr val="accent3">
+              <a:shade val="15000"/>
+            </a:schemeClr>
+          </a:lnRef>
+          <a:fillRef idx="1">
+            <a:schemeClr val="accent3"/>
+          </a:fillRef>
+          <a:effectRef idx="0">
+            <a:schemeClr val="accent3"/>
+          </a:effectRef>
+          <a:fontRef idx="minor">
+            <a:schemeClr val="lt1"/>
+          </a:fontRef>
+        </p:style>
+        <p:txBody>
+          <a:bodyPr rtlCol="0" anchor="ctr"/>
+          <a:lstStyle/>
+          <a:p>
+            <a:pPr algn="ctr"/>
+            <a:r>
+              <a:rPr lang="en-US" altLang="ja-JP" dirty="0" err="1"/>
+              <a:t>VrVehicleModel</a:t>
+            </a:r>
+            <a:endParaRPr kumimoji="1" lang="ja-JP" altLang="en-US" dirty="0"/>
+          </a:p>
+        </p:txBody>
+      </p:sp>
+      <p:cxnSp>
+        <p:nvCxnSpPr>
+          <p:cNvPr id="87" name="直線矢印コネクタ 86">
+            <a:extLst>
+              <a:ext uri="{FF2B5EF4-FFF2-40B4-BE49-F238E27FC236}">
+                <a16:creationId xmlns:a16="http://schemas.microsoft.com/office/drawing/2014/main" id="{B2759226-656C-5C7B-5804-4E6BF3FCD9CE}"/>
+              </a:ext>
+            </a:extLst>
+          </p:cNvPr>
+          <p:cNvCxnSpPr>
+            <a:cxnSpLocks/>
+            <a:stCxn id="42" idx="6"/>
+          </p:cNvCxnSpPr>
+          <p:nvPr/>
+        </p:nvCxnSpPr>
+        <p:spPr>
+          <a:xfrm>
+            <a:off x="6177642" y="4574404"/>
+            <a:ext cx="1722161" cy="306046"/>
+          </a:xfrm>
+          <a:prstGeom prst="straightConnector1">
+            <a:avLst/>
+          </a:prstGeom>
+          <a:ln>
+            <a:tailEnd type="triangle"/>
+          </a:ln>
+        </p:spPr>
+        <p:style>
+          <a:lnRef idx="2">
+            <a:schemeClr val="accent1"/>
+          </a:lnRef>
+          <a:fillRef idx="0">
+            <a:schemeClr val="accent1"/>
+          </a:fillRef>
+          <a:effectRef idx="1">
+            <a:schemeClr val="accent1"/>
+          </a:effectRef>
+          <a:fontRef idx="minor">
+            <a:schemeClr val="tx1"/>
+          </a:fontRef>
+        </p:style>
+      </p:cxnSp>
+      <p:cxnSp>
+        <p:nvCxnSpPr>
+          <p:cNvPr id="88" name="直線矢印コネクタ 87">
+            <a:extLst>
+              <a:ext uri="{FF2B5EF4-FFF2-40B4-BE49-F238E27FC236}">
+                <a16:creationId xmlns:a16="http://schemas.microsoft.com/office/drawing/2014/main" id="{587E5729-C1EC-BBD4-BB71-897C98F9A601}"/>
+              </a:ext>
+            </a:extLst>
+          </p:cNvPr>
+          <p:cNvCxnSpPr>
+            <a:cxnSpLocks/>
+          </p:cNvCxnSpPr>
+          <p:nvPr/>
+        </p:nvCxnSpPr>
+        <p:spPr>
+          <a:xfrm flipH="1" flipV="1">
+            <a:off x="6014359" y="4758758"/>
+            <a:ext cx="1885444" cy="296170"/>
+          </a:xfrm>
+          <a:prstGeom prst="straightConnector1">
+            <a:avLst/>
+          </a:prstGeom>
+          <a:ln>
+            <a:prstDash val="dash"/>
+            <a:tailEnd type="triangle"/>
+          </a:ln>
+        </p:spPr>
+        <p:style>
+          <a:lnRef idx="2">
+            <a:schemeClr val="accent1"/>
+          </a:lnRef>
+          <a:fillRef idx="0">
+            <a:schemeClr val="accent1"/>
+          </a:fillRef>
+          <a:effectRef idx="1">
+            <a:schemeClr val="accent1"/>
+          </a:effectRef>
+          <a:fontRef idx="minor">
+            <a:schemeClr val="tx1"/>
+          </a:fontRef>
+        </p:style>
+      </p:cxnSp>
+      <p:sp>
+        <p:nvSpPr>
+          <p:cNvPr id="89" name="テキスト ボックス 88">
+            <a:extLst>
+              <a:ext uri="{FF2B5EF4-FFF2-40B4-BE49-F238E27FC236}">
+                <a16:creationId xmlns:a16="http://schemas.microsoft.com/office/drawing/2014/main" id="{437A57C1-1165-6FE8-B366-093770501523}"/>
+              </a:ext>
+            </a:extLst>
+          </p:cNvPr>
+          <p:cNvSpPr txBox="1"/>
+          <p:nvPr/>
+        </p:nvSpPr>
+        <p:spPr>
+          <a:xfrm>
+            <a:off x="6755289" y="4508912"/>
+            <a:ext cx="1344847" cy="523220"/>
+          </a:xfrm>
+          <a:prstGeom prst="rect">
+            <a:avLst/>
+          </a:prstGeom>
+          <a:noFill/>
+        </p:spPr>
+        <p:txBody>
+          <a:bodyPr wrap="square" rtlCol="0">
+            <a:spAutoFit/>
+          </a:bodyPr>
+          <a:lstStyle/>
+          <a:p>
+            <a:r>
+              <a:rPr kumimoji="1" lang="en-US" altLang="ja-JP" sz="1400" dirty="0"/>
+              <a:t>1’-3. </a:t>
+            </a:r>
+          </a:p>
+          <a:p>
+            <a:endParaRPr kumimoji="1" lang="ja-JP" altLang="en-US" sz="1400" dirty="0"/>
+          </a:p>
+        </p:txBody>
+      </p:sp>
+      <p:sp>
+        <p:nvSpPr>
+          <p:cNvPr id="90" name="テキスト ボックス 89">
+            <a:extLst>
+              <a:ext uri="{FF2B5EF4-FFF2-40B4-BE49-F238E27FC236}">
+                <a16:creationId xmlns:a16="http://schemas.microsoft.com/office/drawing/2014/main" id="{0047B1BF-CF9A-D3D8-8744-5809D24F081A}"/>
+              </a:ext>
+            </a:extLst>
+          </p:cNvPr>
+          <p:cNvSpPr txBox="1"/>
+          <p:nvPr/>
+        </p:nvSpPr>
+        <p:spPr>
+          <a:xfrm>
+            <a:off x="5586522" y="4685596"/>
+            <a:ext cx="2145582" cy="738664"/>
+          </a:xfrm>
+          <a:prstGeom prst="rect">
+            <a:avLst/>
+          </a:prstGeom>
+          <a:noFill/>
+        </p:spPr>
+        <p:txBody>
+          <a:bodyPr wrap="square" rtlCol="0">
+            <a:spAutoFit/>
+          </a:bodyPr>
+          <a:lstStyle/>
+          <a:p>
+            <a:r>
+              <a:rPr kumimoji="1" lang="en-US" altLang="ja-JP" sz="1400" dirty="0"/>
+              <a:t>2’-1.Callback</a:t>
+            </a:r>
+          </a:p>
+          <a:p>
+            <a:r>
+              <a:rPr kumimoji="1" lang="en-US" altLang="ja-JP" sz="1400" dirty="0"/>
+              <a:t>(</a:t>
+            </a:r>
+            <a:r>
+              <a:rPr kumimoji="1" lang="en-US" altLang="ja-JP" sz="1400" dirty="0" err="1"/>
+              <a:t>VehicleFunc</a:t>
+            </a:r>
+            <a:r>
+              <a:rPr kumimoji="1" lang="ja-JP" altLang="en-US" sz="1400" dirty="0"/>
+              <a:t>利用可否</a:t>
+            </a:r>
+            <a:r>
+              <a:rPr kumimoji="1" lang="en-US" altLang="ja-JP" sz="1400" dirty="0"/>
+              <a:t>)</a:t>
+            </a:r>
+          </a:p>
+          <a:p>
+            <a:endParaRPr kumimoji="1" lang="ja-JP" altLang="en-US" sz="1400" dirty="0"/>
+          </a:p>
+        </p:txBody>
+      </p:sp>
+      <p:sp>
+        <p:nvSpPr>
+          <p:cNvPr id="94" name="テキスト ボックス 93">
+            <a:extLst>
+              <a:ext uri="{FF2B5EF4-FFF2-40B4-BE49-F238E27FC236}">
+                <a16:creationId xmlns:a16="http://schemas.microsoft.com/office/drawing/2014/main" id="{DC66171C-3121-15E9-D3E6-EA0D880BD117}"/>
+              </a:ext>
+            </a:extLst>
+          </p:cNvPr>
+          <p:cNvSpPr txBox="1"/>
+          <p:nvPr/>
+        </p:nvSpPr>
+        <p:spPr>
+          <a:xfrm>
+            <a:off x="1997922" y="4163244"/>
+            <a:ext cx="2628376" cy="523220"/>
+          </a:xfrm>
+          <a:prstGeom prst="rect">
+            <a:avLst/>
+          </a:prstGeom>
+          <a:noFill/>
+        </p:spPr>
+        <p:txBody>
+          <a:bodyPr wrap="square" rtlCol="0">
+            <a:spAutoFit/>
+          </a:bodyPr>
+          <a:lstStyle/>
+          <a:p>
+            <a:r>
+              <a:rPr lang="en-US" altLang="ja-JP" sz="1400" dirty="0"/>
+              <a:t>2’-2. </a:t>
+            </a:r>
+            <a:r>
+              <a:rPr lang="ja-JP" altLang="en-US" sz="1400" dirty="0"/>
+              <a:t>値の変化</a:t>
+            </a:r>
+          </a:p>
+          <a:p>
+            <a:r>
+              <a:rPr kumimoji="1" lang="en-US" altLang="ja-JP" sz="1400" dirty="0"/>
+              <a:t>(</a:t>
+            </a:r>
+            <a:r>
+              <a:rPr lang="ja-JP" altLang="en-US" sz="1400" dirty="0"/>
+              <a:t>ほぼ自動更新）</a:t>
+            </a:r>
+            <a:endParaRPr kumimoji="1" lang="ja-JP" altLang="en-US" sz="1400" dirty="0"/>
+          </a:p>
+        </p:txBody>
+      </p:sp>
+      <p:sp>
+        <p:nvSpPr>
+          <p:cNvPr id="99" name="吹き出し: 四角形 98">
+            <a:extLst>
+              <a:ext uri="{FF2B5EF4-FFF2-40B4-BE49-F238E27FC236}">
+                <a16:creationId xmlns:a16="http://schemas.microsoft.com/office/drawing/2014/main" id="{12024BA4-433B-B20E-E7A5-A863AE413D01}"/>
+              </a:ext>
+            </a:extLst>
+          </p:cNvPr>
+          <p:cNvSpPr/>
+          <p:nvPr/>
+        </p:nvSpPr>
+        <p:spPr>
+          <a:xfrm>
+            <a:off x="460278" y="4415990"/>
+            <a:ext cx="1474431" cy="1740566"/>
+          </a:xfrm>
+          <a:prstGeom prst="wedgeRectCallout">
+            <a:avLst>
+              <a:gd name="adj1" fmla="val 29724"/>
+              <a:gd name="adj2" fmla="val -71121"/>
+            </a:avLst>
+          </a:prstGeom>
+        </p:spPr>
+        <p:style>
+          <a:lnRef idx="2">
+            <a:schemeClr val="accent1">
+              <a:shade val="15000"/>
+            </a:schemeClr>
+          </a:lnRef>
+          <a:fillRef idx="1">
+            <a:schemeClr val="accent1"/>
+          </a:fillRef>
+          <a:effectRef idx="0">
+            <a:schemeClr val="accent1"/>
+          </a:effectRef>
+          <a:fontRef idx="minor">
+            <a:schemeClr val="lt1"/>
+          </a:fontRef>
+        </p:style>
+        <p:txBody>
+          <a:bodyPr rtlCol="0" anchor="ctr"/>
+          <a:lstStyle/>
+          <a:p>
+            <a:pPr algn="ctr"/>
+            <a:endParaRPr kumimoji="1" lang="ja-JP" altLang="en-US"/>
+          </a:p>
+        </p:txBody>
+      </p:sp>
+      <p:pic>
+        <p:nvPicPr>
+          <p:cNvPr id="96" name="図 95">
+            <a:extLst>
+              <a:ext uri="{FF2B5EF4-FFF2-40B4-BE49-F238E27FC236}">
+                <a16:creationId xmlns:a16="http://schemas.microsoft.com/office/drawing/2014/main" id="{0317A8BC-2B08-7C16-836A-CFDF4E212C5F}"/>
+              </a:ext>
+            </a:extLst>
+          </p:cNvPr>
+          <p:cNvPicPr>
+            <a:picLocks noChangeAspect="1"/>
+          </p:cNvPicPr>
+          <p:nvPr/>
+        </p:nvPicPr>
+        <p:blipFill>
+          <a:blip r:embed="rId3"/>
+          <a:stretch>
+            <a:fillRect/>
+          </a:stretch>
+        </p:blipFill>
+        <p:spPr>
+          <a:xfrm>
+            <a:off x="587364" y="4299331"/>
+            <a:ext cx="1230369" cy="1559132"/>
+          </a:xfrm>
+          <a:prstGeom prst="rect">
+            <a:avLst/>
+          </a:prstGeom>
+          <a:ln>
+            <a:solidFill>
+              <a:schemeClr val="tx1"/>
+            </a:solidFill>
+          </a:ln>
+        </p:spPr>
+      </p:pic>
+      <p:pic>
+        <p:nvPicPr>
+          <p:cNvPr id="101" name="図 100">
+            <a:extLst>
+              <a:ext uri="{FF2B5EF4-FFF2-40B4-BE49-F238E27FC236}">
+                <a16:creationId xmlns:a16="http://schemas.microsoft.com/office/drawing/2014/main" id="{9199B2DB-B32D-E815-C06B-A9B18DF9147D}"/>
+              </a:ext>
+            </a:extLst>
+          </p:cNvPr>
+          <p:cNvPicPr>
+            <a:picLocks noChangeAspect="1"/>
+          </p:cNvPicPr>
+          <p:nvPr/>
+        </p:nvPicPr>
+        <p:blipFill>
+          <a:blip r:embed="rId4"/>
+          <a:stretch>
+            <a:fillRect/>
+          </a:stretch>
+        </p:blipFill>
+        <p:spPr>
+          <a:xfrm>
+            <a:off x="9355503" y="1256770"/>
+            <a:ext cx="2244617" cy="2287679"/>
+          </a:xfrm>
+          <a:prstGeom prst="rect">
+            <a:avLst/>
+          </a:prstGeom>
+        </p:spPr>
+      </p:pic>
+      <p:sp>
+        <p:nvSpPr>
+          <p:cNvPr id="102" name="吹き出し: 四角形 101">
+            <a:extLst>
+              <a:ext uri="{FF2B5EF4-FFF2-40B4-BE49-F238E27FC236}">
+                <a16:creationId xmlns:a16="http://schemas.microsoft.com/office/drawing/2014/main" id="{9A3BAC78-4764-D7D3-869A-31FFE3326B12}"/>
+              </a:ext>
+            </a:extLst>
+          </p:cNvPr>
+          <p:cNvSpPr/>
+          <p:nvPr/>
+        </p:nvSpPr>
+        <p:spPr>
+          <a:xfrm>
+            <a:off x="648405" y="5241334"/>
+            <a:ext cx="6969864" cy="1353581"/>
+          </a:xfrm>
+          <a:prstGeom prst="wedgeRectCallout">
+            <a:avLst>
+              <a:gd name="adj1" fmla="val 67427"/>
+              <a:gd name="adj2" fmla="val -48566"/>
+            </a:avLst>
+          </a:prstGeom>
+        </p:spPr>
+        <p:style>
+          <a:lnRef idx="2">
+            <a:schemeClr val="accent4">
+              <a:shade val="15000"/>
+            </a:schemeClr>
+          </a:lnRef>
+          <a:fillRef idx="1">
+            <a:schemeClr val="accent4"/>
+          </a:fillRef>
+          <a:effectRef idx="0">
+            <a:schemeClr val="accent4"/>
+          </a:effectRef>
+          <a:fontRef idx="minor">
+            <a:schemeClr val="lt1"/>
+          </a:fontRef>
+        </p:style>
+        <p:txBody>
+          <a:bodyPr rtlCol="0" anchor="ctr"/>
+          <a:lstStyle/>
+          <a:p>
+            <a:pPr algn="ctr"/>
+            <a:r>
+              <a:rPr lang="en-US" altLang="ja-JP" b="1" dirty="0">
+                <a:solidFill>
+                  <a:srgbClr val="FFFF00"/>
+                </a:solidFill>
+              </a:rPr>
+              <a:t>Python</a:t>
+            </a:r>
+            <a:r>
+              <a:rPr lang="ja-JP" altLang="en-US" b="1" dirty="0">
+                <a:solidFill>
+                  <a:srgbClr val="FFFF00"/>
+                </a:solidFill>
+              </a:rPr>
+              <a:t>から</a:t>
+            </a:r>
+            <a:r>
+              <a:rPr lang="en-US" altLang="ja-JP" b="1" dirty="0">
+                <a:solidFill>
+                  <a:srgbClr val="FFFF00"/>
+                </a:solidFill>
+              </a:rPr>
+              <a:t>DLL</a:t>
+            </a:r>
+            <a:r>
+              <a:rPr lang="ja-JP" altLang="en-US" b="1" dirty="0">
+                <a:solidFill>
+                  <a:srgbClr val="FFFF00"/>
+                </a:solidFill>
+              </a:rPr>
+              <a:t>（</a:t>
+            </a:r>
+            <a:r>
+              <a:rPr lang="en-US" altLang="ja-JP" b="1" dirty="0">
+                <a:solidFill>
+                  <a:srgbClr val="FFFF00"/>
+                </a:solidFill>
+              </a:rPr>
+              <a:t>C</a:t>
+            </a:r>
+            <a:r>
+              <a:rPr lang="ja-JP" altLang="en-US" b="1" dirty="0">
+                <a:solidFill>
+                  <a:srgbClr val="FFFF00"/>
+                </a:solidFill>
+              </a:rPr>
+              <a:t>の動的ライブラリ）を呼ぶために</a:t>
+            </a:r>
+            <a:endParaRPr lang="en-US" altLang="ja-JP" b="1" dirty="0">
+              <a:solidFill>
+                <a:srgbClr val="FFFF00"/>
+              </a:solidFill>
+            </a:endParaRPr>
+          </a:p>
+          <a:p>
+            <a:pPr algn="ctr"/>
+            <a:r>
+              <a:rPr lang="ja-JP" altLang="en-US" b="1" dirty="0">
+                <a:solidFill>
+                  <a:srgbClr val="FFFF00"/>
+                </a:solidFill>
+              </a:rPr>
+              <a:t>どんなコードを書けば良いのか、実例で解説します。</a:t>
+            </a:r>
+            <a:endParaRPr lang="en-US" altLang="ja-JP" b="1" dirty="0">
+              <a:solidFill>
+                <a:srgbClr val="FFFF00"/>
+              </a:solidFill>
+            </a:endParaRPr>
+          </a:p>
+        </p:txBody>
+      </p:sp>
+      <p:sp>
+        <p:nvSpPr>
+          <p:cNvPr id="2" name="楕円 1">
+            <a:extLst>
+              <a:ext uri="{FF2B5EF4-FFF2-40B4-BE49-F238E27FC236}">
+                <a16:creationId xmlns:a16="http://schemas.microsoft.com/office/drawing/2014/main" id="{FF8CF92B-87A3-181D-6C08-17B05967FAE5}"/>
+              </a:ext>
+            </a:extLst>
+          </p:cNvPr>
+          <p:cNvSpPr/>
+          <p:nvPr/>
+        </p:nvSpPr>
+        <p:spPr>
+          <a:xfrm>
+            <a:off x="7869415" y="5538166"/>
+            <a:ext cx="3693470" cy="680955"/>
+          </a:xfrm>
+          <a:prstGeom prst="ellipse">
+            <a:avLst/>
+          </a:prstGeom>
+        </p:spPr>
+        <p:style>
+          <a:lnRef idx="2">
+            <a:schemeClr val="accent2">
+              <a:shade val="15000"/>
+            </a:schemeClr>
+          </a:lnRef>
+          <a:fillRef idx="1">
+            <a:schemeClr val="accent2"/>
+          </a:fillRef>
+          <a:effectRef idx="0">
+            <a:schemeClr val="accent2"/>
+          </a:effectRef>
+          <a:fontRef idx="minor">
+            <a:schemeClr val="lt1"/>
+          </a:fontRef>
+        </p:style>
+        <p:txBody>
+          <a:bodyPr rtlCol="0" anchor="ctr"/>
+          <a:lstStyle/>
+          <a:p>
+            <a:pPr algn="ctr"/>
+            <a:r>
+              <a:rPr kumimoji="1" lang="en-US" altLang="ja-JP" dirty="0" err="1"/>
+              <a:t>VclModDll</a:t>
+            </a:r>
+            <a:r>
+              <a:rPr kumimoji="1" lang="en-US" altLang="ja-JP" dirty="0"/>
+              <a:t> (C</a:t>
+            </a:r>
+            <a:r>
+              <a:rPr lang="ja-JP" altLang="en-US" dirty="0"/>
+              <a:t>言語）</a:t>
+            </a:r>
+            <a:endParaRPr kumimoji="1" lang="ja-JP" altLang="en-US" dirty="0"/>
+          </a:p>
+        </p:txBody>
+      </p:sp>
+      <p:cxnSp>
+        <p:nvCxnSpPr>
+          <p:cNvPr id="5" name="直線矢印コネクタ 4">
+            <a:extLst>
+              <a:ext uri="{FF2B5EF4-FFF2-40B4-BE49-F238E27FC236}">
+                <a16:creationId xmlns:a16="http://schemas.microsoft.com/office/drawing/2014/main" id="{A8FEE2B0-4791-BCF6-B8E7-36F48A670D82}"/>
+              </a:ext>
+            </a:extLst>
+          </p:cNvPr>
+          <p:cNvCxnSpPr>
+            <a:cxnSpLocks/>
+            <a:endCxn id="2" idx="0"/>
+          </p:cNvCxnSpPr>
+          <p:nvPr/>
+        </p:nvCxnSpPr>
+        <p:spPr>
+          <a:xfrm>
+            <a:off x="9716150" y="5207510"/>
+            <a:ext cx="0" cy="330656"/>
+          </a:xfrm>
+          <a:prstGeom prst="straightConnector1">
+            <a:avLst/>
+          </a:prstGeom>
+          <a:ln>
+            <a:tailEnd type="triangle"/>
+          </a:ln>
+        </p:spPr>
+        <p:style>
+          <a:lnRef idx="2">
+            <a:schemeClr val="accent1"/>
+          </a:lnRef>
+          <a:fillRef idx="0">
+            <a:schemeClr val="accent1"/>
+          </a:fillRef>
+          <a:effectRef idx="1">
+            <a:schemeClr val="accent1"/>
+          </a:effectRef>
+          <a:fontRef idx="minor">
+            <a:schemeClr val="tx1"/>
+          </a:fontRef>
+        </p:style>
+      </p:cxnSp>
+      <p:cxnSp>
+        <p:nvCxnSpPr>
+          <p:cNvPr id="12" name="直線矢印コネクタ 11">
+            <a:extLst>
+              <a:ext uri="{FF2B5EF4-FFF2-40B4-BE49-F238E27FC236}">
+                <a16:creationId xmlns:a16="http://schemas.microsoft.com/office/drawing/2014/main" id="{C1C622D2-3E67-C335-3144-801F6CA4FD70}"/>
+              </a:ext>
+            </a:extLst>
+          </p:cNvPr>
+          <p:cNvCxnSpPr>
+            <a:cxnSpLocks/>
+          </p:cNvCxnSpPr>
+          <p:nvPr/>
+        </p:nvCxnSpPr>
+        <p:spPr>
+          <a:xfrm flipV="1">
+            <a:off x="9355503" y="5236782"/>
+            <a:ext cx="0" cy="296922"/>
+          </a:xfrm>
+          <a:prstGeom prst="straightConnector1">
+            <a:avLst/>
+          </a:prstGeom>
+          <a:ln>
+            <a:prstDash val="dash"/>
+            <a:tailEnd type="triangle"/>
+          </a:ln>
+        </p:spPr>
+        <p:style>
+          <a:lnRef idx="2">
+            <a:schemeClr val="accent1"/>
+          </a:lnRef>
+          <a:fillRef idx="0">
+            <a:schemeClr val="accent1"/>
+          </a:fillRef>
+          <a:effectRef idx="1">
+            <a:schemeClr val="accent1"/>
+          </a:effectRef>
+          <a:fontRef idx="minor">
+            <a:schemeClr val="tx1"/>
+          </a:fontRef>
+        </p:style>
+      </p:cxnSp>
+    </p:spTree>
+    <p:extLst>
+      <p:ext uri="{BB962C8B-B14F-4D97-AF65-F5344CB8AC3E}">
+        <p14:creationId xmlns:p14="http://schemas.microsoft.com/office/powerpoint/2010/main" val="227557451"/>
       </p:ext>
     </p:extLst>
   </p:cSld>

</xml_diff>